<commit_message>
Demo3: Updated design with new files from Michael.
</commit_message>
<xml_diff>
--- a/design/crane/electricalDiagram.pptx
+++ b/design/crane/electricalDiagram.pptx
@@ -104,6 +104,22 @@
       </a:defRPr>
     </a:lvl9pPr>
   </p:defaultTextStyle>
+  <p:extLst>
+    <p:ext uri="{EFAFB233-063F-42B5-8137-9DF3F51BA10A}">
+      <p15:sldGuideLst xmlns:p15="http://schemas.microsoft.com/office/powerpoint/2012/main">
+        <p15:guide id="1" orient="horz" pos="2160">
+          <p15:clr>
+            <a:srgbClr val="A4A3A4"/>
+          </p15:clr>
+        </p15:guide>
+        <p15:guide id="2" pos="3840">
+          <p15:clr>
+            <a:srgbClr val="A4A3A4"/>
+          </p15:clr>
+        </p15:guide>
+      </p15:sldGuideLst>
+    </p:ext>
+  </p:extLst>
 </p:presentation>
 </file>
 
@@ -238,7 +254,7 @@
           <a:p>
             <a:fld id="{5A852F11-8B9F-4E3A-84B2-D575512D38C3}" type="datetimeFigureOut">
               <a:rPr lang="en-US" smtClean="0"/>
-              <a:t>3/31/2016</a:t>
+              <a:t>5/7/2016</a:t>
             </a:fld>
             <a:endParaRPr lang="en-US"/>
           </a:p>
@@ -408,7 +424,7 @@
           <a:p>
             <a:fld id="{5A852F11-8B9F-4E3A-84B2-D575512D38C3}" type="datetimeFigureOut">
               <a:rPr lang="en-US" smtClean="0"/>
-              <a:t>3/31/2016</a:t>
+              <a:t>5/7/2016</a:t>
             </a:fld>
             <a:endParaRPr lang="en-US"/>
           </a:p>
@@ -588,7 +604,7 @@
           <a:p>
             <a:fld id="{5A852F11-8B9F-4E3A-84B2-D575512D38C3}" type="datetimeFigureOut">
               <a:rPr lang="en-US" smtClean="0"/>
-              <a:t>3/31/2016</a:t>
+              <a:t>5/7/2016</a:t>
             </a:fld>
             <a:endParaRPr lang="en-US"/>
           </a:p>
@@ -758,7 +774,7 @@
           <a:p>
             <a:fld id="{5A852F11-8B9F-4E3A-84B2-D575512D38C3}" type="datetimeFigureOut">
               <a:rPr lang="en-US" smtClean="0"/>
-              <a:t>3/31/2016</a:t>
+              <a:t>5/7/2016</a:t>
             </a:fld>
             <a:endParaRPr lang="en-US"/>
           </a:p>
@@ -1004,7 +1020,7 @@
           <a:p>
             <a:fld id="{5A852F11-8B9F-4E3A-84B2-D575512D38C3}" type="datetimeFigureOut">
               <a:rPr lang="en-US" smtClean="0"/>
-              <a:t>3/31/2016</a:t>
+              <a:t>5/7/2016</a:t>
             </a:fld>
             <a:endParaRPr lang="en-US"/>
           </a:p>
@@ -1236,7 +1252,7 @@
           <a:p>
             <a:fld id="{5A852F11-8B9F-4E3A-84B2-D575512D38C3}" type="datetimeFigureOut">
               <a:rPr lang="en-US" smtClean="0"/>
-              <a:t>3/31/2016</a:t>
+              <a:t>5/7/2016</a:t>
             </a:fld>
             <a:endParaRPr lang="en-US"/>
           </a:p>
@@ -1603,7 +1619,7 @@
           <a:p>
             <a:fld id="{5A852F11-8B9F-4E3A-84B2-D575512D38C3}" type="datetimeFigureOut">
               <a:rPr lang="en-US" smtClean="0"/>
-              <a:t>3/31/2016</a:t>
+              <a:t>5/7/2016</a:t>
             </a:fld>
             <a:endParaRPr lang="en-US"/>
           </a:p>
@@ -1721,7 +1737,7 @@
           <a:p>
             <a:fld id="{5A852F11-8B9F-4E3A-84B2-D575512D38C3}" type="datetimeFigureOut">
               <a:rPr lang="en-US" smtClean="0"/>
-              <a:t>3/31/2016</a:t>
+              <a:t>5/7/2016</a:t>
             </a:fld>
             <a:endParaRPr lang="en-US"/>
           </a:p>
@@ -1816,7 +1832,7 @@
           <a:p>
             <a:fld id="{5A852F11-8B9F-4E3A-84B2-D575512D38C3}" type="datetimeFigureOut">
               <a:rPr lang="en-US" smtClean="0"/>
-              <a:t>3/31/2016</a:t>
+              <a:t>5/7/2016</a:t>
             </a:fld>
             <a:endParaRPr lang="en-US"/>
           </a:p>
@@ -2093,7 +2109,7 @@
           <a:p>
             <a:fld id="{5A852F11-8B9F-4E3A-84B2-D575512D38C3}" type="datetimeFigureOut">
               <a:rPr lang="en-US" smtClean="0"/>
-              <a:t>3/31/2016</a:t>
+              <a:t>5/7/2016</a:t>
             </a:fld>
             <a:endParaRPr lang="en-US"/>
           </a:p>
@@ -2346,7 +2362,7 @@
           <a:p>
             <a:fld id="{5A852F11-8B9F-4E3A-84B2-D575512D38C3}" type="datetimeFigureOut">
               <a:rPr lang="en-US" smtClean="0"/>
-              <a:t>3/31/2016</a:t>
+              <a:t>5/7/2016</a:t>
             </a:fld>
             <a:endParaRPr lang="en-US"/>
           </a:p>
@@ -2559,7 +2575,7 @@
           <a:p>
             <a:fld id="{5A852F11-8B9F-4E3A-84B2-D575512D38C3}" type="datetimeFigureOut">
               <a:rPr lang="en-US" smtClean="0"/>
-              <a:t>3/31/2016</a:t>
+              <a:t>5/7/2016</a:t>
             </a:fld>
             <a:endParaRPr lang="en-US"/>
           </a:p>
@@ -2966,20 +2982,20 @@
       </p:grpSpPr>
       <p:sp>
         <p:nvSpPr>
-          <p:cNvPr id="4" name="TextBox 3"/>
+          <p:cNvPr id="8" name="TextBox 7"/>
           <p:cNvSpPr txBox="1"/>
           <p:nvPr/>
         </p:nvSpPr>
         <p:spPr>
           <a:xfrm>
-            <a:off x="8019340" y="1670476"/>
-            <a:ext cx="1834445" cy="2630311"/>
+            <a:off x="5091745" y="2255068"/>
+            <a:ext cx="3804356" cy="1600200"/>
           </a:xfrm>
           <a:prstGeom prst="rect">
             <a:avLst/>
           </a:prstGeom>
           <a:solidFill>
-            <a:srgbClr val="FF0066"/>
+            <a:schemeClr val="accent1"/>
           </a:solidFill>
           <a:ln w="28575">
             <a:solidFill>
@@ -2987,20 +3003,6 @@
             </a:solidFill>
           </a:ln>
         </p:spPr>
-        <p:style>
-          <a:lnRef idx="1">
-            <a:schemeClr val="accent3"/>
-          </a:lnRef>
-          <a:fillRef idx="3">
-            <a:schemeClr val="accent3"/>
-          </a:fillRef>
-          <a:effectRef idx="2">
-            <a:schemeClr val="accent3"/>
-          </a:effectRef>
-          <a:fontRef idx="minor">
-            <a:schemeClr val="lt1"/>
-          </a:fontRef>
-        </p:style>
         <p:txBody>
           <a:bodyPr wrap="square" rtlCol="0">
             <a:spAutoFit/>
@@ -3013,20 +3015,20 @@
       </p:sp>
       <p:sp>
         <p:nvSpPr>
-          <p:cNvPr id="5" name="TextBox 4"/>
+          <p:cNvPr id="9" name="TextBox 8"/>
           <p:cNvSpPr txBox="1"/>
           <p:nvPr/>
         </p:nvSpPr>
         <p:spPr>
           <a:xfrm>
-            <a:off x="8332606" y="2439567"/>
-            <a:ext cx="1207911" cy="646331"/>
+            <a:off x="6083941" y="2890224"/>
+            <a:ext cx="1648177" cy="461665"/>
           </a:xfrm>
           <a:prstGeom prst="rect">
             <a:avLst/>
           </a:prstGeom>
           <a:noFill/>
-          <a:ln w="38100">
+          <a:ln w="28575">
             <a:solidFill>
               <a:schemeClr val="tx1"/>
             </a:solidFill>
@@ -3040,29 +3042,36 @@
           <a:p>
             <a:pPr algn="ctr"/>
             <a:r>
-              <a:rPr lang="en-US" dirty="0" smtClean="0"/>
-              <a:t>Raspberry Pi</a:t>
-            </a:r>
-            <a:endParaRPr lang="en-US" dirty="0"/>
-          </a:p>
-        </p:txBody>
-      </p:sp>
-      <p:sp>
-        <p:nvSpPr>
-          <p:cNvPr id="6" name="TextBox 5"/>
+              <a:rPr lang="en-US" sz="1200" dirty="0" smtClean="0"/>
+              <a:t>OpenCM</a:t>
+            </a:r>
+          </a:p>
+          <a:p>
+            <a:pPr algn="ctr"/>
+            <a:r>
+              <a:rPr lang="en-US" sz="1200" dirty="0" smtClean="0"/>
+              <a:t>Microcontroller</a:t>
+            </a:r>
+            <a:endParaRPr lang="en-US" sz="1200" dirty="0"/>
+          </a:p>
+        </p:txBody>
+      </p:sp>
+      <p:sp>
+        <p:nvSpPr>
+          <p:cNvPr id="10" name="TextBox 9"/>
           <p:cNvSpPr txBox="1"/>
           <p:nvPr/>
         </p:nvSpPr>
         <p:spPr>
           <a:xfrm>
-            <a:off x="8029920" y="3285124"/>
-            <a:ext cx="629356" cy="1015663"/>
+            <a:off x="6518564" y="2255068"/>
+            <a:ext cx="778933" cy="400110"/>
           </a:xfrm>
           <a:prstGeom prst="rect">
             <a:avLst/>
           </a:prstGeom>
           <a:noFill/>
-          <a:ln w="38100">
+          <a:ln w="28575">
             <a:solidFill>
               <a:schemeClr val="tx1"/>
             </a:solidFill>
@@ -3075,43 +3084,23 @@
           <a:lstStyle/>
           <a:p>
             <a:r>
-              <a:rPr lang="en-US" sz="1200" dirty="0" smtClean="0"/>
-              <a:t>USB0</a:t>
-            </a:r>
-          </a:p>
-          <a:p>
-            <a:r>
-              <a:rPr lang="en-US" sz="1200" dirty="0" smtClean="0"/>
-              <a:t>USB1</a:t>
-            </a:r>
-          </a:p>
-          <a:p>
-            <a:r>
-              <a:rPr lang="en-US" sz="1200" dirty="0" smtClean="0"/>
-              <a:t>USB2</a:t>
-            </a:r>
-          </a:p>
-          <a:p>
-            <a:r>
-              <a:rPr lang="en-US" sz="1200" dirty="0" smtClean="0"/>
-              <a:t>USB3</a:t>
-            </a:r>
-          </a:p>
-          <a:p>
-            <a:endParaRPr lang="en-US" sz="1200" dirty="0" smtClean="0"/>
-          </a:p>
-        </p:txBody>
-      </p:sp>
-      <p:sp>
-        <p:nvSpPr>
-          <p:cNvPr id="7" name="TextBox 6"/>
+              <a:rPr lang="en-US" sz="2000" dirty="0" smtClean="0"/>
+              <a:t>+ - + -</a:t>
+            </a:r>
+            <a:endParaRPr lang="en-US" sz="2000" dirty="0"/>
+          </a:p>
+        </p:txBody>
+      </p:sp>
+      <p:sp>
+        <p:nvSpPr>
+          <p:cNvPr id="11" name="TextBox 10"/>
           <p:cNvSpPr txBox="1"/>
           <p:nvPr/>
         </p:nvSpPr>
         <p:spPr>
           <a:xfrm>
-            <a:off x="8492062" y="1681763"/>
-            <a:ext cx="888997" cy="461665"/>
+            <a:off x="5738921" y="3459737"/>
+            <a:ext cx="835378" cy="383862"/>
           </a:xfrm>
           <a:prstGeom prst="rect">
             <a:avLst/>
@@ -3131,198 +3120,8 @@
           <a:p>
             <a:pPr algn="ctr"/>
             <a:r>
-              <a:rPr lang="en-US" sz="1200" dirty="0" smtClean="0"/>
-              <a:t>Micro </a:t>
-            </a:r>
-          </a:p>
-          <a:p>
-            <a:pPr algn="ctr"/>
-            <a:r>
-              <a:rPr lang="en-US" sz="1200" dirty="0" smtClean="0"/>
-              <a:t>USB</a:t>
-            </a:r>
-            <a:endParaRPr lang="en-US" sz="1200" dirty="0"/>
-          </a:p>
-        </p:txBody>
-      </p:sp>
-      <p:sp>
-        <p:nvSpPr>
-          <p:cNvPr id="8" name="TextBox 7"/>
-          <p:cNvSpPr txBox="1"/>
-          <p:nvPr/>
-        </p:nvSpPr>
-        <p:spPr>
-          <a:xfrm>
-            <a:off x="1564735" y="2255068"/>
-            <a:ext cx="3804356" cy="1600200"/>
-          </a:xfrm>
-          <a:prstGeom prst="rect">
-            <a:avLst/>
-          </a:prstGeom>
-          <a:solidFill>
-            <a:schemeClr val="accent1"/>
-          </a:solidFill>
-          <a:ln w="28575">
-            <a:solidFill>
-              <a:schemeClr val="tx1"/>
-            </a:solidFill>
-          </a:ln>
-        </p:spPr>
-        <p:txBody>
-          <a:bodyPr wrap="square" rtlCol="0">
-            <a:spAutoFit/>
-          </a:bodyPr>
-          <a:lstStyle/>
-          <a:p>
-            <a:endParaRPr lang="en-US" dirty="0"/>
-          </a:p>
-        </p:txBody>
-      </p:sp>
-      <p:sp>
-        <p:nvSpPr>
-          <p:cNvPr id="9" name="TextBox 8"/>
-          <p:cNvSpPr txBox="1"/>
-          <p:nvPr/>
-        </p:nvSpPr>
-        <p:spPr>
-          <a:xfrm>
-            <a:off x="2556931" y="2890224"/>
-            <a:ext cx="1648177" cy="461665"/>
-          </a:xfrm>
-          <a:prstGeom prst="rect">
-            <a:avLst/>
-          </a:prstGeom>
-          <a:noFill/>
-          <a:ln w="28575">
-            <a:solidFill>
-              <a:schemeClr val="tx1"/>
-            </a:solidFill>
-          </a:ln>
-        </p:spPr>
-        <p:txBody>
-          <a:bodyPr wrap="square" rtlCol="0">
-            <a:spAutoFit/>
-          </a:bodyPr>
-          <a:lstStyle/>
-          <a:p>
-            <a:pPr algn="ctr"/>
-            <a:r>
-              <a:rPr lang="en-US" sz="1200" dirty="0" smtClean="0"/>
-              <a:t>OpenCM</a:t>
-            </a:r>
-          </a:p>
-          <a:p>
-            <a:pPr algn="ctr"/>
-            <a:r>
-              <a:rPr lang="en-US" sz="1200" dirty="0" smtClean="0"/>
-              <a:t>Microcontroller</a:t>
-            </a:r>
-            <a:endParaRPr lang="en-US" sz="1200" dirty="0"/>
-          </a:p>
-        </p:txBody>
-      </p:sp>
-      <p:sp>
-        <p:nvSpPr>
-          <p:cNvPr id="10" name="TextBox 9"/>
-          <p:cNvSpPr txBox="1"/>
-          <p:nvPr/>
-        </p:nvSpPr>
-        <p:spPr>
-          <a:xfrm>
-            <a:off x="2991554" y="2255068"/>
-            <a:ext cx="778933" cy="400110"/>
-          </a:xfrm>
-          <a:prstGeom prst="rect">
-            <a:avLst/>
-          </a:prstGeom>
-          <a:noFill/>
-          <a:ln w="28575">
-            <a:solidFill>
-              <a:schemeClr val="tx1"/>
-            </a:solidFill>
-          </a:ln>
-        </p:spPr>
-        <p:txBody>
-          <a:bodyPr wrap="square" rtlCol="0">
-            <a:spAutoFit/>
-          </a:bodyPr>
-          <a:lstStyle/>
-          <a:p>
-            <a:r>
-              <a:rPr lang="en-US" sz="2000" dirty="0" smtClean="0"/>
-              <a:t>+ - + -</a:t>
-            </a:r>
-            <a:endParaRPr lang="en-US" sz="2000" dirty="0"/>
-          </a:p>
-        </p:txBody>
-      </p:sp>
-      <p:sp>
-        <p:nvSpPr>
-          <p:cNvPr id="11" name="TextBox 10"/>
-          <p:cNvSpPr txBox="1"/>
-          <p:nvPr/>
-        </p:nvSpPr>
-        <p:spPr>
-          <a:xfrm>
-            <a:off x="2211911" y="3459737"/>
-            <a:ext cx="835378" cy="383862"/>
-          </a:xfrm>
-          <a:prstGeom prst="rect">
-            <a:avLst/>
-          </a:prstGeom>
-          <a:noFill/>
-          <a:ln w="38100">
-            <a:solidFill>
-              <a:schemeClr val="tx1"/>
-            </a:solidFill>
-          </a:ln>
-        </p:spPr>
-        <p:txBody>
-          <a:bodyPr wrap="square" rtlCol="0">
-            <a:spAutoFit/>
-          </a:bodyPr>
-          <a:lstStyle/>
-          <a:p>
-            <a:pPr algn="ctr"/>
-            <a:r>
               <a:rPr lang="en-US" dirty="0" smtClean="0"/>
-              <a:t>serial1</a:t>
-            </a:r>
-            <a:endParaRPr lang="en-US" dirty="0"/>
-          </a:p>
-        </p:txBody>
-      </p:sp>
-      <p:sp>
-        <p:nvSpPr>
-          <p:cNvPr id="12" name="TextBox 11"/>
-          <p:cNvSpPr txBox="1"/>
-          <p:nvPr/>
-        </p:nvSpPr>
-        <p:spPr>
-          <a:xfrm>
-            <a:off x="3770487" y="3459737"/>
-            <a:ext cx="835378" cy="383862"/>
-          </a:xfrm>
-          <a:prstGeom prst="rect">
-            <a:avLst/>
-          </a:prstGeom>
-          <a:noFill/>
-          <a:ln w="38100">
-            <a:solidFill>
-              <a:schemeClr val="tx1"/>
-            </a:solidFill>
-          </a:ln>
-        </p:spPr>
-        <p:txBody>
-          <a:bodyPr wrap="square" rtlCol="0">
-            <a:spAutoFit/>
-          </a:bodyPr>
-          <a:lstStyle/>
-          <a:p>
-            <a:pPr algn="ctr"/>
-            <a:r>
-              <a:rPr lang="en-US" dirty="0" smtClean="0"/>
-              <a:t>serial2</a:t>
+              <a:t>serial</a:t>
             </a:r>
             <a:endParaRPr lang="en-US" dirty="0"/>
           </a:p>
@@ -3336,7 +3135,7 @@
         </p:nvSpPr>
         <p:spPr>
           <a:xfrm>
-            <a:off x="2166755" y="4599419"/>
+            <a:off x="5693765" y="4599419"/>
             <a:ext cx="925689" cy="646331"/>
           </a:xfrm>
           <a:prstGeom prst="rect">
@@ -3381,7 +3180,7 @@
         </p:nvSpPr>
         <p:spPr>
           <a:xfrm>
-            <a:off x="3722509" y="4589493"/>
+            <a:off x="7471282" y="4591975"/>
             <a:ext cx="931333" cy="640687"/>
           </a:xfrm>
           <a:prstGeom prst="rect">
@@ -3426,7 +3225,7 @@
         </p:nvSpPr>
         <p:spPr>
           <a:xfrm>
-            <a:off x="4480276" y="2812666"/>
+            <a:off x="8002523" y="2812666"/>
             <a:ext cx="888997" cy="461665"/>
           </a:xfrm>
           <a:prstGeom prst="rect">
@@ -3461,41 +3260,6 @@
           </a:p>
         </p:txBody>
       </p:sp>
-      <p:cxnSp>
-        <p:nvCxnSpPr>
-          <p:cNvPr id="20" name="Straight Connector 19"/>
-          <p:cNvCxnSpPr/>
-          <p:nvPr/>
-        </p:nvCxnSpPr>
-        <p:spPr>
-          <a:xfrm>
-            <a:off x="10374489" y="1344034"/>
-            <a:ext cx="869245" cy="0"/>
-          </a:xfrm>
-          <a:prstGeom prst="line">
-            <a:avLst/>
-          </a:prstGeom>
-          <a:ln w="38100">
-            <a:solidFill>
-              <a:schemeClr val="tx1"/>
-            </a:solidFill>
-          </a:ln>
-        </p:spPr>
-        <p:style>
-          <a:lnRef idx="1">
-            <a:schemeClr val="accent1"/>
-          </a:lnRef>
-          <a:fillRef idx="0">
-            <a:schemeClr val="accent1"/>
-          </a:fillRef>
-          <a:effectRef idx="0">
-            <a:schemeClr val="accent1"/>
-          </a:effectRef>
-          <a:fontRef idx="minor">
-            <a:schemeClr val="tx1"/>
-          </a:fontRef>
-        </p:style>
-      </p:cxnSp>
       <p:cxnSp>
         <p:nvCxnSpPr>
           <p:cNvPr id="21" name="Straight Connector 20"/>
@@ -3504,7 +3268,7 @@
         </p:nvCxnSpPr>
         <p:spPr>
           <a:xfrm>
-            <a:off x="4500028" y="891823"/>
+            <a:off x="8027038" y="891823"/>
             <a:ext cx="869245" cy="0"/>
           </a:xfrm>
           <a:prstGeom prst="line">
@@ -3539,43 +3303,8 @@
         </p:nvCxnSpPr>
         <p:spPr>
           <a:xfrm>
-            <a:off x="1495776" y="891823"/>
+            <a:off x="5022786" y="891823"/>
             <a:ext cx="869245" cy="0"/>
-          </a:xfrm>
-          <a:prstGeom prst="line">
-            <a:avLst/>
-          </a:prstGeom>
-          <a:ln w="38100">
-            <a:solidFill>
-              <a:schemeClr val="tx1"/>
-            </a:solidFill>
-          </a:ln>
-        </p:spPr>
-        <p:style>
-          <a:lnRef idx="1">
-            <a:schemeClr val="accent1"/>
-          </a:lnRef>
-          <a:fillRef idx="0">
-            <a:schemeClr val="accent1"/>
-          </a:fillRef>
-          <a:effectRef idx="0">
-            <a:schemeClr val="accent1"/>
-          </a:effectRef>
-          <a:fontRef idx="minor">
-            <a:schemeClr val="tx1"/>
-          </a:fontRef>
-        </p:style>
-      </p:cxnSp>
-      <p:cxnSp>
-        <p:nvCxnSpPr>
-          <p:cNvPr id="26" name="Straight Connector 25"/>
-          <p:cNvCxnSpPr/>
-          <p:nvPr/>
-        </p:nvCxnSpPr>
-        <p:spPr>
-          <a:xfrm>
-            <a:off x="10543822" y="1457275"/>
-            <a:ext cx="541867" cy="0"/>
           </a:xfrm>
           <a:prstGeom prst="line">
             <a:avLst/>
@@ -3609,7 +3338,7 @@
         </p:nvCxnSpPr>
         <p:spPr>
           <a:xfrm>
-            <a:off x="4663716" y="1010355"/>
+            <a:off x="8190726" y="1010355"/>
             <a:ext cx="541867" cy="0"/>
           </a:xfrm>
           <a:prstGeom prst="line">
@@ -3644,7 +3373,7 @@
         </p:nvCxnSpPr>
         <p:spPr>
           <a:xfrm>
-            <a:off x="1670044" y="1000830"/>
+            <a:off x="5197054" y="1000830"/>
             <a:ext cx="541867" cy="0"/>
           </a:xfrm>
           <a:prstGeom prst="line">
@@ -3679,7 +3408,7 @@
         </p:nvCxnSpPr>
         <p:spPr>
           <a:xfrm>
-            <a:off x="1940977" y="1010355"/>
+            <a:off x="5467987" y="1010355"/>
             <a:ext cx="0" cy="644610"/>
           </a:xfrm>
           <a:prstGeom prst="line">
@@ -3714,255 +3443,8 @@
         </p:nvCxnSpPr>
         <p:spPr>
           <a:xfrm>
-            <a:off x="4934649" y="1010355"/>
+            <a:off x="8461659" y="1010355"/>
             <a:ext cx="0" cy="644610"/>
-          </a:xfrm>
-          <a:prstGeom prst="line">
-            <a:avLst/>
-          </a:prstGeom>
-          <a:ln w="28575">
-            <a:solidFill>
-              <a:schemeClr val="tx1"/>
-            </a:solidFill>
-          </a:ln>
-        </p:spPr>
-        <p:style>
-          <a:lnRef idx="1">
-            <a:schemeClr val="accent1"/>
-          </a:lnRef>
-          <a:fillRef idx="0">
-            <a:schemeClr val="accent1"/>
-          </a:fillRef>
-          <a:effectRef idx="0">
-            <a:schemeClr val="accent1"/>
-          </a:effectRef>
-          <a:fontRef idx="minor">
-            <a:schemeClr val="tx1"/>
-          </a:fontRef>
-        </p:style>
-      </p:cxnSp>
-      <p:cxnSp>
-        <p:nvCxnSpPr>
-          <p:cNvPr id="47" name="Straight Connector 46"/>
-          <p:cNvCxnSpPr/>
-          <p:nvPr/>
-        </p:nvCxnSpPr>
-        <p:spPr>
-          <a:xfrm flipV="1">
-            <a:off x="10809111" y="724275"/>
-            <a:ext cx="2821" cy="597754"/>
-          </a:xfrm>
-          <a:prstGeom prst="line">
-            <a:avLst/>
-          </a:prstGeom>
-          <a:ln w="28575">
-            <a:solidFill>
-              <a:schemeClr val="tx1"/>
-            </a:solidFill>
-          </a:ln>
-        </p:spPr>
-        <p:style>
-          <a:lnRef idx="1">
-            <a:schemeClr val="accent1"/>
-          </a:lnRef>
-          <a:fillRef idx="0">
-            <a:schemeClr val="accent1"/>
-          </a:fillRef>
-          <a:effectRef idx="0">
-            <a:schemeClr val="accent1"/>
-          </a:effectRef>
-          <a:fontRef idx="minor">
-            <a:schemeClr val="tx1"/>
-          </a:fontRef>
-        </p:style>
-      </p:cxnSp>
-      <p:cxnSp>
-        <p:nvCxnSpPr>
-          <p:cNvPr id="50" name="Straight Connector 49"/>
-          <p:cNvCxnSpPr/>
-          <p:nvPr/>
-        </p:nvCxnSpPr>
-        <p:spPr>
-          <a:xfrm flipH="1">
-            <a:off x="8936560" y="734908"/>
-            <a:ext cx="1878195" cy="1"/>
-          </a:xfrm>
-          <a:prstGeom prst="line">
-            <a:avLst/>
-          </a:prstGeom>
-          <a:ln w="28575">
-            <a:solidFill>
-              <a:schemeClr val="tx1"/>
-            </a:solidFill>
-          </a:ln>
-        </p:spPr>
-        <p:style>
-          <a:lnRef idx="1">
-            <a:schemeClr val="accent1"/>
-          </a:lnRef>
-          <a:fillRef idx="0">
-            <a:schemeClr val="accent1"/>
-          </a:fillRef>
-          <a:effectRef idx="0">
-            <a:schemeClr val="accent1"/>
-          </a:effectRef>
-          <a:fontRef idx="minor">
-            <a:schemeClr val="tx1"/>
-          </a:fontRef>
-        </p:style>
-      </p:cxnSp>
-      <p:cxnSp>
-        <p:nvCxnSpPr>
-          <p:cNvPr id="55" name="Straight Connector 54"/>
-          <p:cNvCxnSpPr>
-            <a:endCxn id="4" idx="0"/>
-          </p:cNvCxnSpPr>
-          <p:nvPr/>
-        </p:nvCxnSpPr>
-        <p:spPr>
-          <a:xfrm>
-            <a:off x="8936560" y="734908"/>
-            <a:ext cx="3" cy="935568"/>
-          </a:xfrm>
-          <a:prstGeom prst="line">
-            <a:avLst/>
-          </a:prstGeom>
-          <a:ln w="28575">
-            <a:solidFill>
-              <a:schemeClr val="tx1"/>
-            </a:solidFill>
-          </a:ln>
-        </p:spPr>
-        <p:style>
-          <a:lnRef idx="1">
-            <a:schemeClr val="accent1"/>
-          </a:lnRef>
-          <a:fillRef idx="0">
-            <a:schemeClr val="accent1"/>
-          </a:fillRef>
-          <a:effectRef idx="0">
-            <a:schemeClr val="accent1"/>
-          </a:effectRef>
-          <a:fontRef idx="minor">
-            <a:schemeClr val="tx1"/>
-          </a:fontRef>
-        </p:style>
-      </p:cxnSp>
-      <p:cxnSp>
-        <p:nvCxnSpPr>
-          <p:cNvPr id="58" name="Straight Connector 57"/>
-          <p:cNvCxnSpPr/>
-          <p:nvPr/>
-        </p:nvCxnSpPr>
-        <p:spPr>
-          <a:xfrm flipH="1">
-            <a:off x="10809111" y="1457275"/>
-            <a:ext cx="5643" cy="1037042"/>
-          </a:xfrm>
-          <a:prstGeom prst="line">
-            <a:avLst/>
-          </a:prstGeom>
-          <a:ln w="28575">
-            <a:solidFill>
-              <a:schemeClr val="tx1"/>
-            </a:solidFill>
-          </a:ln>
-        </p:spPr>
-        <p:style>
-          <a:lnRef idx="1">
-            <a:schemeClr val="accent1"/>
-          </a:lnRef>
-          <a:fillRef idx="0">
-            <a:schemeClr val="accent1"/>
-          </a:fillRef>
-          <a:effectRef idx="0">
-            <a:schemeClr val="accent1"/>
-          </a:effectRef>
-          <a:fontRef idx="minor">
-            <a:schemeClr val="tx1"/>
-          </a:fontRef>
-        </p:style>
-      </p:cxnSp>
-      <p:cxnSp>
-        <p:nvCxnSpPr>
-          <p:cNvPr id="63" name="Straight Connector 62"/>
-          <p:cNvCxnSpPr/>
-          <p:nvPr/>
-        </p:nvCxnSpPr>
-        <p:spPr>
-          <a:xfrm>
-            <a:off x="10588269" y="2494317"/>
-            <a:ext cx="440270" cy="0"/>
-          </a:xfrm>
-          <a:prstGeom prst="line">
-            <a:avLst/>
-          </a:prstGeom>
-          <a:ln w="28575">
-            <a:solidFill>
-              <a:schemeClr val="tx1"/>
-            </a:solidFill>
-          </a:ln>
-        </p:spPr>
-        <p:style>
-          <a:lnRef idx="1">
-            <a:schemeClr val="accent1"/>
-          </a:lnRef>
-          <a:fillRef idx="0">
-            <a:schemeClr val="accent1"/>
-          </a:fillRef>
-          <a:effectRef idx="0">
-            <a:schemeClr val="accent1"/>
-          </a:effectRef>
-          <a:fontRef idx="minor">
-            <a:schemeClr val="tx1"/>
-          </a:fontRef>
-        </p:style>
-      </p:cxnSp>
-      <p:cxnSp>
-        <p:nvCxnSpPr>
-          <p:cNvPr id="64" name="Straight Connector 63"/>
-          <p:cNvCxnSpPr/>
-          <p:nvPr/>
-        </p:nvCxnSpPr>
-        <p:spPr>
-          <a:xfrm>
-            <a:off x="10699038" y="2566048"/>
-            <a:ext cx="231433" cy="0"/>
-          </a:xfrm>
-          <a:prstGeom prst="line">
-            <a:avLst/>
-          </a:prstGeom>
-          <a:ln w="28575">
-            <a:solidFill>
-              <a:schemeClr val="tx1"/>
-            </a:solidFill>
-          </a:ln>
-        </p:spPr>
-        <p:style>
-          <a:lnRef idx="1">
-            <a:schemeClr val="accent1"/>
-          </a:lnRef>
-          <a:fillRef idx="0">
-            <a:schemeClr val="accent1"/>
-          </a:fillRef>
-          <a:effectRef idx="0">
-            <a:schemeClr val="accent1"/>
-          </a:effectRef>
-          <a:fontRef idx="minor">
-            <a:schemeClr val="tx1"/>
-          </a:fontRef>
-        </p:style>
-      </p:cxnSp>
-      <p:cxnSp>
-        <p:nvCxnSpPr>
-          <p:cNvPr id="77" name="Straight Connector 76"/>
-          <p:cNvCxnSpPr/>
-          <p:nvPr/>
-        </p:nvCxnSpPr>
-        <p:spPr>
-          <a:xfrm>
-            <a:off x="10746307" y="2647581"/>
-            <a:ext cx="127014" cy="0"/>
           </a:xfrm>
           <a:prstGeom prst="line">
             <a:avLst/>
@@ -3996,7 +3478,7 @@
         </p:nvCxnSpPr>
         <p:spPr>
           <a:xfrm rot="5400000">
-            <a:off x="2710991" y="1878388"/>
+            <a:off x="6238001" y="1878388"/>
             <a:ext cx="869245" cy="0"/>
           </a:xfrm>
           <a:prstGeom prst="line">
@@ -4031,7 +3513,7 @@
         </p:nvCxnSpPr>
         <p:spPr>
           <a:xfrm rot="5400000">
-            <a:off x="2712910" y="1021500"/>
+            <a:off x="6235157" y="1021500"/>
             <a:ext cx="869245" cy="0"/>
           </a:xfrm>
           <a:prstGeom prst="line">
@@ -4066,7 +3548,7 @@
         </p:nvCxnSpPr>
         <p:spPr>
           <a:xfrm rot="5400000">
-            <a:off x="3045026" y="1878389"/>
+            <a:off x="6572036" y="1878389"/>
             <a:ext cx="869245" cy="0"/>
           </a:xfrm>
           <a:prstGeom prst="line">
@@ -4101,7 +3583,7 @@
         </p:nvCxnSpPr>
         <p:spPr>
           <a:xfrm rot="5400000">
-            <a:off x="3045026" y="1036041"/>
+            <a:off x="6572036" y="1036041"/>
             <a:ext cx="869245" cy="0"/>
           </a:xfrm>
           <a:prstGeom prst="line">
@@ -4136,7 +3618,7 @@
         </p:nvCxnSpPr>
         <p:spPr>
           <a:xfrm rot="10800000">
-            <a:off x="4077701" y="1654965"/>
+            <a:off x="7604711" y="1654965"/>
             <a:ext cx="869245" cy="0"/>
           </a:xfrm>
           <a:prstGeom prst="line">
@@ -4171,7 +3653,7 @@
         </p:nvCxnSpPr>
         <p:spPr>
           <a:xfrm rot="10800000">
-            <a:off x="1931734" y="1670021"/>
+            <a:off x="5453981" y="1660495"/>
             <a:ext cx="869245" cy="0"/>
           </a:xfrm>
           <a:prstGeom prst="line">
@@ -4206,7 +3688,7 @@
         </p:nvCxnSpPr>
         <p:spPr>
           <a:xfrm rot="10800000">
-            <a:off x="2430121" y="1670022"/>
+            <a:off x="5957131" y="1660496"/>
             <a:ext cx="869245" cy="0"/>
           </a:xfrm>
           <a:prstGeom prst="line">
@@ -4241,7 +3723,7 @@
         </p:nvCxnSpPr>
         <p:spPr>
           <a:xfrm rot="10800000">
-            <a:off x="3625246" y="1654965"/>
+            <a:off x="7152256" y="1654965"/>
             <a:ext cx="869245" cy="0"/>
           </a:xfrm>
           <a:prstGeom prst="line">
@@ -4276,7 +3758,7 @@
         </p:nvCxnSpPr>
         <p:spPr>
           <a:xfrm rot="5400000">
-            <a:off x="3358969" y="1903245"/>
+            <a:off x="6876453" y="1903245"/>
             <a:ext cx="541867" cy="0"/>
           </a:xfrm>
           <a:prstGeom prst="line">
@@ -4311,7 +3793,7 @@
         </p:nvCxnSpPr>
         <p:spPr>
           <a:xfrm rot="5400000">
-            <a:off x="3349612" y="2042631"/>
+            <a:off x="6876622" y="2042631"/>
             <a:ext cx="541867" cy="0"/>
           </a:xfrm>
           <a:prstGeom prst="line">
@@ -4346,7 +3828,7 @@
         </p:nvCxnSpPr>
         <p:spPr>
           <a:xfrm rot="5400000">
-            <a:off x="3023231" y="2045564"/>
+            <a:off x="6550241" y="2045564"/>
             <a:ext cx="541867" cy="0"/>
           </a:xfrm>
           <a:prstGeom prst="line">
@@ -4381,7 +3863,7 @@
         </p:nvCxnSpPr>
         <p:spPr>
           <a:xfrm rot="5400000">
-            <a:off x="3025964" y="1914573"/>
+            <a:off x="6552974" y="1914573"/>
             <a:ext cx="541867" cy="0"/>
           </a:xfrm>
           <a:prstGeom prst="line">
@@ -4416,7 +3898,7 @@
         </p:nvCxnSpPr>
         <p:spPr>
           <a:xfrm rot="10800000">
-            <a:off x="3454249" y="612315"/>
+            <a:off x="7005074" y="612315"/>
             <a:ext cx="541867" cy="0"/>
           </a:xfrm>
           <a:prstGeom prst="line">
@@ -4451,7 +3933,7 @@
         </p:nvCxnSpPr>
         <p:spPr>
           <a:xfrm rot="10800000">
-            <a:off x="3996116" y="613354"/>
+            <a:off x="7523126" y="613354"/>
             <a:ext cx="541867" cy="0"/>
           </a:xfrm>
           <a:prstGeom prst="line">
@@ -4486,7 +3968,7 @@
         </p:nvCxnSpPr>
         <p:spPr>
           <a:xfrm rot="10800000">
-            <a:off x="4403700" y="616892"/>
+            <a:off x="7930710" y="612129"/>
             <a:ext cx="541867" cy="0"/>
           </a:xfrm>
           <a:prstGeom prst="line">
@@ -4521,7 +4003,7 @@
         </p:nvCxnSpPr>
         <p:spPr>
           <a:xfrm rot="10800000">
-            <a:off x="2629600" y="601800"/>
+            <a:off x="6132795" y="606563"/>
             <a:ext cx="541867" cy="0"/>
           </a:xfrm>
           <a:prstGeom prst="line">
@@ -4556,7 +4038,7 @@
         </p:nvCxnSpPr>
         <p:spPr>
           <a:xfrm rot="10800000">
-            <a:off x="2111020" y="604905"/>
+            <a:off x="5638030" y="604905"/>
             <a:ext cx="541867" cy="0"/>
           </a:xfrm>
           <a:prstGeom prst="line">
@@ -4591,7 +4073,7 @@
         </p:nvCxnSpPr>
         <p:spPr>
           <a:xfrm rot="10800000">
-            <a:off x="1930650" y="601570"/>
+            <a:off x="5471949" y="606333"/>
             <a:ext cx="541867" cy="0"/>
           </a:xfrm>
           <a:prstGeom prst="line">
@@ -4626,7 +4108,7 @@
         </p:nvCxnSpPr>
         <p:spPr>
           <a:xfrm flipH="1" flipV="1">
-            <a:off x="4946946" y="601418"/>
+            <a:off x="8473956" y="601418"/>
             <a:ext cx="1" cy="290405"/>
           </a:xfrm>
           <a:prstGeom prst="line">
@@ -4661,7 +4143,7 @@
         </p:nvCxnSpPr>
         <p:spPr>
           <a:xfrm flipV="1">
-            <a:off x="1953937" y="591943"/>
+            <a:off x="5480947" y="591943"/>
             <a:ext cx="2" cy="291306"/>
           </a:xfrm>
           <a:prstGeom prst="line">
@@ -4696,7 +4178,7 @@
         </p:nvSpPr>
         <p:spPr>
           <a:xfrm>
-            <a:off x="5334053" y="734908"/>
+            <a:off x="8861063" y="734908"/>
             <a:ext cx="712478" cy="369332"/>
           </a:xfrm>
           <a:prstGeom prst="rect">
@@ -4727,7 +4209,7 @@
         </p:nvCxnSpPr>
         <p:spPr>
           <a:xfrm rot="10800000">
-            <a:off x="3996116" y="613354"/>
+            <a:off x="7523126" y="613354"/>
             <a:ext cx="541867" cy="0"/>
           </a:xfrm>
           <a:prstGeom prst="line">
@@ -4762,7 +4244,7 @@
         </p:nvSpPr>
         <p:spPr>
           <a:xfrm>
-            <a:off x="838390" y="734908"/>
+            <a:off x="4365400" y="734908"/>
             <a:ext cx="712478" cy="369332"/>
           </a:xfrm>
           <a:prstGeom prst="rect">
@@ -4782,238 +4264,6 @@
               <a:t>3.7  V </a:t>
             </a:r>
             <a:endParaRPr lang="en-US" dirty="0"/>
-          </a:p>
-        </p:txBody>
-      </p:sp>
-      <p:cxnSp>
-        <p:nvCxnSpPr>
-          <p:cNvPr id="118" name="Elbow Connector 117"/>
-          <p:cNvCxnSpPr/>
-          <p:nvPr/>
-        </p:nvCxnSpPr>
-        <p:spPr>
-          <a:xfrm>
-            <a:off x="5343118" y="3037414"/>
-            <a:ext cx="2656115" cy="359955"/>
-          </a:xfrm>
-          <a:prstGeom prst="bentConnector3">
-            <a:avLst/>
-          </a:prstGeom>
-          <a:ln>
-            <a:solidFill>
-              <a:schemeClr val="tx1"/>
-            </a:solidFill>
-            <a:headEnd type="triangle"/>
-            <a:tailEnd type="triangle"/>
-          </a:ln>
-        </p:spPr>
-        <p:style>
-          <a:lnRef idx="1">
-            <a:schemeClr val="accent1"/>
-          </a:lnRef>
-          <a:fillRef idx="0">
-            <a:schemeClr val="accent1"/>
-          </a:fillRef>
-          <a:effectRef idx="0">
-            <a:schemeClr val="accent1"/>
-          </a:effectRef>
-          <a:fontRef idx="minor">
-            <a:schemeClr val="tx1"/>
-          </a:fontRef>
-        </p:style>
-      </p:cxnSp>
-      <p:sp>
-        <p:nvSpPr>
-          <p:cNvPr id="121" name="TextBox 120"/>
-          <p:cNvSpPr txBox="1"/>
-          <p:nvPr/>
-        </p:nvSpPr>
-        <p:spPr>
-          <a:xfrm>
-            <a:off x="5824571" y="2789582"/>
-            <a:ext cx="846605" cy="307777"/>
-          </a:xfrm>
-          <a:prstGeom prst="rect">
-            <a:avLst/>
-          </a:prstGeom>
-          <a:noFill/>
-        </p:spPr>
-        <p:txBody>
-          <a:bodyPr wrap="square" rtlCol="0">
-            <a:spAutoFit/>
-          </a:bodyPr>
-          <a:lstStyle/>
-          <a:p>
-            <a:r>
-              <a:rPr lang="en-US" sz="1400" dirty="0" smtClean="0"/>
-              <a:t>Serial</a:t>
-            </a:r>
-            <a:endParaRPr lang="en-US" sz="1400" dirty="0"/>
-          </a:p>
-        </p:txBody>
-      </p:sp>
-      <p:cxnSp>
-        <p:nvCxnSpPr>
-          <p:cNvPr id="123" name="Straight Arrow Connector 122"/>
-          <p:cNvCxnSpPr/>
-          <p:nvPr/>
-        </p:nvCxnSpPr>
-        <p:spPr>
-          <a:xfrm>
-            <a:off x="6680214" y="3609138"/>
-            <a:ext cx="1322010" cy="0"/>
-          </a:xfrm>
-          <a:prstGeom prst="straightConnector1">
-            <a:avLst/>
-          </a:prstGeom>
-          <a:ln>
-            <a:solidFill>
-              <a:schemeClr val="tx1"/>
-            </a:solidFill>
-            <a:tailEnd type="triangle"/>
-          </a:ln>
-        </p:spPr>
-        <p:style>
-          <a:lnRef idx="1">
-            <a:schemeClr val="accent1"/>
-          </a:lnRef>
-          <a:fillRef idx="0">
-            <a:schemeClr val="accent1"/>
-          </a:fillRef>
-          <a:effectRef idx="0">
-            <a:schemeClr val="accent1"/>
-          </a:effectRef>
-          <a:fontRef idx="minor">
-            <a:schemeClr val="tx1"/>
-          </a:fontRef>
-        </p:style>
-      </p:cxnSp>
-      <p:cxnSp>
-        <p:nvCxnSpPr>
-          <p:cNvPr id="126" name="Straight Arrow Connector 125"/>
-          <p:cNvCxnSpPr/>
-          <p:nvPr/>
-        </p:nvCxnSpPr>
-        <p:spPr>
-          <a:xfrm>
-            <a:off x="6681808" y="3799353"/>
-            <a:ext cx="1322010" cy="0"/>
-          </a:xfrm>
-          <a:prstGeom prst="straightConnector1">
-            <a:avLst/>
-          </a:prstGeom>
-          <a:ln>
-            <a:solidFill>
-              <a:schemeClr val="tx1"/>
-            </a:solidFill>
-            <a:tailEnd type="triangle"/>
-          </a:ln>
-        </p:spPr>
-        <p:style>
-          <a:lnRef idx="1">
-            <a:schemeClr val="accent1"/>
-          </a:lnRef>
-          <a:fillRef idx="0">
-            <a:schemeClr val="accent1"/>
-          </a:fillRef>
-          <a:effectRef idx="0">
-            <a:schemeClr val="accent1"/>
-          </a:effectRef>
-          <a:fontRef idx="minor">
-            <a:schemeClr val="tx1"/>
-          </a:fontRef>
-        </p:style>
-      </p:cxnSp>
-      <p:sp>
-        <p:nvSpPr>
-          <p:cNvPr id="128" name="TextBox 127"/>
-          <p:cNvSpPr txBox="1"/>
-          <p:nvPr/>
-        </p:nvSpPr>
-        <p:spPr>
-          <a:xfrm>
-            <a:off x="9662011" y="1159368"/>
-            <a:ext cx="712478" cy="369332"/>
-          </a:xfrm>
-          <a:prstGeom prst="rect">
-            <a:avLst/>
-          </a:prstGeom>
-          <a:noFill/>
-        </p:spPr>
-        <p:txBody>
-          <a:bodyPr wrap="square" rtlCol="0">
-            <a:spAutoFit/>
-          </a:bodyPr>
-          <a:lstStyle/>
-          <a:p>
-            <a:pPr algn="ctr"/>
-            <a:r>
-              <a:rPr lang="en-US" dirty="0" smtClean="0"/>
-              <a:t>5  V </a:t>
-            </a:r>
-            <a:endParaRPr lang="en-US" dirty="0"/>
-          </a:p>
-        </p:txBody>
-      </p:sp>
-      <p:sp>
-        <p:nvSpPr>
-          <p:cNvPr id="129" name="TextBox 128"/>
-          <p:cNvSpPr txBox="1"/>
-          <p:nvPr/>
-        </p:nvSpPr>
-        <p:spPr>
-          <a:xfrm>
-            <a:off x="5666310" y="3428928"/>
-            <a:ext cx="1100196" cy="307777"/>
-          </a:xfrm>
-          <a:prstGeom prst="rect">
-            <a:avLst/>
-          </a:prstGeom>
-          <a:noFill/>
-        </p:spPr>
-        <p:txBody>
-          <a:bodyPr wrap="square" rtlCol="0">
-            <a:spAutoFit/>
-          </a:bodyPr>
-          <a:lstStyle/>
-          <a:p>
-            <a:pPr algn="ctr"/>
-            <a:r>
-              <a:rPr lang="en-US" sz="1400" dirty="0" smtClean="0"/>
-              <a:t>WIFI Dongle</a:t>
-            </a:r>
-            <a:endParaRPr lang="en-US" sz="1400" dirty="0"/>
-          </a:p>
-        </p:txBody>
-      </p:sp>
-      <p:sp>
-        <p:nvSpPr>
-          <p:cNvPr id="131" name="TextBox 130"/>
-          <p:cNvSpPr txBox="1"/>
-          <p:nvPr/>
-        </p:nvSpPr>
-        <p:spPr>
-          <a:xfrm>
-            <a:off x="5819307" y="3626030"/>
-            <a:ext cx="1100196" cy="307777"/>
-          </a:xfrm>
-          <a:prstGeom prst="rect">
-            <a:avLst/>
-          </a:prstGeom>
-          <a:noFill/>
-        </p:spPr>
-        <p:txBody>
-          <a:bodyPr wrap="square" rtlCol="0">
-            <a:spAutoFit/>
-          </a:bodyPr>
-          <a:lstStyle/>
-          <a:p>
-            <a:pPr algn="ctr"/>
-            <a:r>
-              <a:rPr lang="en-US" sz="1400" dirty="0" smtClean="0"/>
-              <a:t>Camera</a:t>
-            </a:r>
-            <a:endParaRPr lang="en-US" sz="1400" dirty="0"/>
           </a:p>
         </p:txBody>
       </p:sp>
@@ -5024,8 +4274,8 @@
           <p:nvPr/>
         </p:nvCxnSpPr>
         <p:spPr>
-          <a:xfrm>
-            <a:off x="4597387" y="3832966"/>
+          <a:xfrm rot="16200000">
+            <a:off x="7034446" y="4888139"/>
             <a:ext cx="0" cy="711487"/>
           </a:xfrm>
           <a:prstGeom prst="straightConnector1">
@@ -5064,7 +4314,7 @@
         </p:nvCxnSpPr>
         <p:spPr>
           <a:xfrm>
-            <a:off x="3038762" y="3843598"/>
+            <a:off x="6565772" y="3843598"/>
             <a:ext cx="0" cy="711487"/>
           </a:xfrm>
           <a:prstGeom prst="straightConnector1">
@@ -5103,7 +4353,7 @@
         </p:nvCxnSpPr>
         <p:spPr>
           <a:xfrm>
-            <a:off x="2222544" y="3843598"/>
+            <a:off x="5749554" y="3843598"/>
             <a:ext cx="0" cy="711487"/>
           </a:xfrm>
           <a:prstGeom prst="straightConnector1">
@@ -5138,8 +4388,8 @@
           <p:nvPr/>
         </p:nvCxnSpPr>
         <p:spPr>
-          <a:xfrm>
-            <a:off x="3774295" y="3831252"/>
+          <a:xfrm rot="16200000">
+            <a:off x="7050104" y="4305738"/>
             <a:ext cx="0" cy="711487"/>
           </a:xfrm>
           <a:prstGeom prst="straightConnector1">
@@ -5174,8 +4424,8 @@
           <p:nvPr/>
         </p:nvCxnSpPr>
         <p:spPr>
-          <a:xfrm>
-            <a:off x="4202089" y="3824841"/>
+          <a:xfrm rot="16200000">
+            <a:off x="7043377" y="4596939"/>
             <a:ext cx="0" cy="711487"/>
           </a:xfrm>
           <a:prstGeom prst="straightConnector1">
@@ -5211,7 +4461,7 @@
         </p:nvCxnSpPr>
         <p:spPr>
           <a:xfrm>
-            <a:off x="2629599" y="3835474"/>
+            <a:off x="6156609" y="3835474"/>
             <a:ext cx="0" cy="711487"/>
           </a:xfrm>
           <a:prstGeom prst="straightConnector1">
@@ -5246,9 +4496,9 @@
           <p:nvPr/>
         </p:nvSpPr>
         <p:spPr>
-          <a:xfrm rot="16200000" flipH="1">
-            <a:off x="4030393" y="3924755"/>
-            <a:ext cx="846605" cy="307777"/>
+          <a:xfrm flipH="1">
+            <a:off x="6736997" y="4967459"/>
+            <a:ext cx="612759" cy="307777"/>
           </a:xfrm>
           <a:prstGeom prst="rect">
             <a:avLst/>
@@ -5261,6 +4511,7 @@
           </a:bodyPr>
           <a:lstStyle/>
           <a:p>
+            <a:pPr algn="ctr"/>
             <a:r>
               <a:rPr lang="en-US" sz="1400" dirty="0" smtClean="0">
                 <a:solidFill>
@@ -5289,7 +4540,7 @@
         </p:nvSpPr>
         <p:spPr>
           <a:xfrm rot="16200000" flipH="1">
-            <a:off x="2481750" y="3924756"/>
+            <a:off x="6008760" y="3924756"/>
             <a:ext cx="846605" cy="307777"/>
           </a:xfrm>
           <a:prstGeom prst="rect">
@@ -5330,9 +4581,9 @@
           <p:nvPr/>
         </p:nvSpPr>
         <p:spPr>
-          <a:xfrm rot="16200000" flipH="1">
-            <a:off x="3608650" y="3996281"/>
-            <a:ext cx="846605" cy="307777"/>
+          <a:xfrm flipH="1">
+            <a:off x="6611142" y="4644906"/>
+            <a:ext cx="779047" cy="307777"/>
           </a:xfrm>
           <a:prstGeom prst="rect">
             <a:avLst/>
@@ -5345,6 +4596,7 @@
           </a:bodyPr>
           <a:lstStyle/>
           <a:p>
+            <a:pPr algn="ctr"/>
             <a:r>
               <a:rPr lang="en-US" sz="1400" dirty="0" smtClean="0"/>
               <a:t>Ground</a:t>
@@ -5361,7 +4613,7 @@
         </p:nvSpPr>
         <p:spPr>
           <a:xfrm rot="16200000" flipH="1">
-            <a:off x="2039867" y="4033106"/>
+            <a:off x="5566877" y="4033106"/>
             <a:ext cx="846605" cy="307777"/>
           </a:xfrm>
           <a:prstGeom prst="rect">
@@ -5390,9 +4642,9 @@
           <p:nvPr/>
         </p:nvSpPr>
         <p:spPr>
-          <a:xfrm rot="16200000" flipH="1">
-            <a:off x="3164646" y="3999752"/>
-            <a:ext cx="846605" cy="307777"/>
+          <a:xfrm flipH="1">
+            <a:off x="6761772" y="4323386"/>
+            <a:ext cx="477788" cy="317338"/>
           </a:xfrm>
           <a:prstGeom prst="rect">
             <a:avLst/>
@@ -5405,6 +4657,7 @@
           </a:bodyPr>
           <a:lstStyle/>
           <a:p>
+            <a:pPr algn="ctr"/>
             <a:r>
               <a:rPr lang="en-US" sz="1400" dirty="0" smtClean="0">
                 <a:solidFill>
@@ -5429,7 +4682,7 @@
         </p:nvSpPr>
         <p:spPr>
           <a:xfrm rot="16200000" flipH="1">
-            <a:off x="1625938" y="4012385"/>
+            <a:off x="5152948" y="4012385"/>
             <a:ext cx="846605" cy="307777"/>
           </a:xfrm>
           <a:prstGeom prst="rect">
@@ -5467,7 +4720,7 @@
         </p:nvCxnSpPr>
         <p:spPr>
           <a:xfrm>
-            <a:off x="3273189" y="2316630"/>
+            <a:off x="6809725" y="2316630"/>
             <a:ext cx="127014" cy="0"/>
           </a:xfrm>
           <a:prstGeom prst="line">
@@ -5502,7 +4755,7 @@
         </p:nvCxnSpPr>
         <p:spPr>
           <a:xfrm>
-            <a:off x="3359919" y="2316630"/>
+            <a:off x="6901218" y="2316630"/>
             <a:ext cx="127014" cy="0"/>
           </a:xfrm>
           <a:prstGeom prst="line">
@@ -5537,7 +4790,7 @@
         </p:nvSpPr>
         <p:spPr>
           <a:xfrm>
-            <a:off x="3026583" y="1876926"/>
+            <a:off x="6553593" y="1876926"/>
             <a:ext cx="214247" cy="164243"/>
           </a:xfrm>
           <a:prstGeom prst="ellipse">
@@ -5585,7 +4838,7 @@
         </p:nvSpPr>
         <p:spPr>
           <a:xfrm>
-            <a:off x="3508262" y="1880424"/>
+            <a:off x="7035272" y="1880424"/>
             <a:ext cx="214247" cy="164243"/>
           </a:xfrm>
           <a:prstGeom prst="ellipse">
@@ -5633,7 +4886,7 @@
         </p:nvSpPr>
         <p:spPr>
           <a:xfrm flipH="1">
-            <a:off x="2627365" y="1836304"/>
+            <a:off x="6154375" y="1836304"/>
             <a:ext cx="846605" cy="307777"/>
           </a:xfrm>
           <a:prstGeom prst="rect">
@@ -5671,7 +4924,7 @@
         </p:nvSpPr>
         <p:spPr>
           <a:xfrm flipH="1">
-            <a:off x="3727202" y="1810397"/>
+            <a:off x="7254212" y="1810397"/>
             <a:ext cx="846605" cy="307777"/>
           </a:xfrm>
           <a:prstGeom prst="rect">
@@ -5701,7 +4954,7 @@
         </p:nvSpPr>
         <p:spPr>
           <a:xfrm>
-            <a:off x="8432346" y="4610297"/>
+            <a:off x="9241293" y="4599213"/>
             <a:ext cx="931333" cy="640687"/>
           </a:xfrm>
           <a:prstGeom prst="rect">
@@ -5732,7 +4985,7 @@
             <a:pPr algn="ctr"/>
             <a:r>
               <a:rPr lang="en-US" dirty="0" smtClean="0"/>
-              <a:t>Servo</a:t>
+              <a:t>Servo`</a:t>
             </a:r>
             <a:endParaRPr lang="en-US" dirty="0"/>
           </a:p>
@@ -5740,13 +4993,13 @@
       </p:sp>
       <p:sp>
         <p:nvSpPr>
-          <p:cNvPr id="80" name="TextBox 79"/>
+          <p:cNvPr id="137" name="TextBox 136"/>
           <p:cNvSpPr txBox="1"/>
           <p:nvPr/>
         </p:nvSpPr>
         <p:spPr>
           <a:xfrm>
-            <a:off x="5306341" y="4589576"/>
+            <a:off x="11011304" y="4596983"/>
             <a:ext cx="931333" cy="640687"/>
           </a:xfrm>
           <a:prstGeom prst="rect">
@@ -5785,22 +5038,20 @@
       </p:sp>
       <p:sp>
         <p:nvSpPr>
-          <p:cNvPr id="81" name="TextBox 80"/>
+          <p:cNvPr id="122" name="TextBox 121"/>
           <p:cNvSpPr txBox="1"/>
           <p:nvPr/>
         </p:nvSpPr>
         <p:spPr>
           <a:xfrm>
-            <a:off x="6869305" y="4600584"/>
-            <a:ext cx="931333" cy="640687"/>
+            <a:off x="5099648" y="2556853"/>
+            <a:ext cx="569767" cy="246221"/>
           </a:xfrm>
           <a:prstGeom prst="rect">
             <a:avLst/>
           </a:prstGeom>
-          <a:solidFill>
-            <a:schemeClr val="accent6"/>
-          </a:solidFill>
-          <a:ln w="38100">
+          <a:noFill/>
+          <a:ln>
             <a:solidFill>
               <a:schemeClr val="tx1"/>
             </a:solidFill>
@@ -5812,17 +5063,191 @@
           </a:bodyPr>
           <a:lstStyle/>
           <a:p>
+            <a:r>
+              <a:rPr lang="en-US" sz="1000" dirty="0" smtClean="0"/>
+              <a:t>GND</a:t>
+            </a:r>
+            <a:endParaRPr lang="en-US" sz="1000" dirty="0"/>
+          </a:p>
+        </p:txBody>
+      </p:sp>
+      <p:sp>
+        <p:nvSpPr>
+          <p:cNvPr id="124" name="TextBox 123"/>
+          <p:cNvSpPr txBox="1"/>
+          <p:nvPr/>
+        </p:nvSpPr>
+        <p:spPr>
+          <a:xfrm>
+            <a:off x="5087405" y="2308249"/>
+            <a:ext cx="321132" cy="246221"/>
+          </a:xfrm>
+          <a:prstGeom prst="rect">
+            <a:avLst/>
+          </a:prstGeom>
+          <a:noFill/>
+          <a:ln>
+            <a:solidFill>
+              <a:schemeClr val="tx1"/>
+            </a:solidFill>
+          </a:ln>
+        </p:spPr>
+        <p:txBody>
+          <a:bodyPr wrap="square" rtlCol="0">
+            <a:spAutoFit/>
+          </a:bodyPr>
+          <a:lstStyle/>
+          <a:p>
+            <a:r>
+              <a:rPr lang="en-US" sz="1000" dirty="0" smtClean="0"/>
+              <a:t>5V</a:t>
+            </a:r>
+            <a:endParaRPr lang="en-US" sz="1000" dirty="0"/>
+          </a:p>
+        </p:txBody>
+      </p:sp>
+      <p:sp>
+        <p:nvSpPr>
+          <p:cNvPr id="127" name="TextBox 126"/>
+          <p:cNvSpPr txBox="1"/>
+          <p:nvPr/>
+        </p:nvSpPr>
+        <p:spPr>
+          <a:xfrm>
+            <a:off x="5099649" y="2805050"/>
+            <a:ext cx="321132" cy="246221"/>
+          </a:xfrm>
+          <a:prstGeom prst="rect">
+            <a:avLst/>
+          </a:prstGeom>
+          <a:noFill/>
+          <a:ln>
+            <a:solidFill>
+              <a:schemeClr val="tx1"/>
+            </a:solidFill>
+          </a:ln>
+        </p:spPr>
+        <p:txBody>
+          <a:bodyPr wrap="square" rtlCol="0">
+            <a:spAutoFit/>
+          </a:bodyPr>
+          <a:lstStyle/>
+          <a:p>
+            <a:r>
+              <a:rPr lang="en-US" sz="1000" dirty="0" smtClean="0"/>
+              <a:t>P8</a:t>
+            </a:r>
+          </a:p>
+        </p:txBody>
+      </p:sp>
+      <p:sp>
+        <p:nvSpPr>
+          <p:cNvPr id="132" name="TextBox 131"/>
+          <p:cNvSpPr txBox="1"/>
+          <p:nvPr/>
+        </p:nvSpPr>
+        <p:spPr>
+          <a:xfrm>
+            <a:off x="5100056" y="3052428"/>
+            <a:ext cx="321132" cy="246221"/>
+          </a:xfrm>
+          <a:prstGeom prst="rect">
+            <a:avLst/>
+          </a:prstGeom>
+          <a:noFill/>
+          <a:ln>
+            <a:solidFill>
+              <a:schemeClr val="tx1"/>
+            </a:solidFill>
+          </a:ln>
+        </p:spPr>
+        <p:txBody>
+          <a:bodyPr wrap="square" rtlCol="0">
+            <a:spAutoFit/>
+          </a:bodyPr>
+          <a:lstStyle/>
+          <a:p>
+            <a:r>
+              <a:rPr lang="en-US" sz="1000" dirty="0" smtClean="0"/>
+              <a:t>P9</a:t>
+            </a:r>
+          </a:p>
+        </p:txBody>
+      </p:sp>
+      <p:sp>
+        <p:nvSpPr>
+          <p:cNvPr id="134" name="TextBox 133"/>
+          <p:cNvSpPr txBox="1"/>
+          <p:nvPr/>
+        </p:nvSpPr>
+        <p:spPr>
+          <a:xfrm>
+            <a:off x="5100055" y="3304157"/>
+            <a:ext cx="385654" cy="246221"/>
+          </a:xfrm>
+          <a:prstGeom prst="rect">
+            <a:avLst/>
+          </a:prstGeom>
+          <a:noFill/>
+          <a:ln>
+            <a:solidFill>
+              <a:schemeClr val="tx1"/>
+            </a:solidFill>
+          </a:ln>
+        </p:spPr>
+        <p:txBody>
+          <a:bodyPr wrap="square" rtlCol="0">
+            <a:spAutoFit/>
+          </a:bodyPr>
+          <a:lstStyle/>
+          <a:p>
+            <a:r>
+              <a:rPr lang="en-US" sz="1000" dirty="0" smtClean="0"/>
+              <a:t>P15</a:t>
+            </a:r>
+          </a:p>
+        </p:txBody>
+      </p:sp>
+      <p:sp>
+        <p:nvSpPr>
+          <p:cNvPr id="3" name="TextBox 2"/>
+          <p:cNvSpPr txBox="1"/>
+          <p:nvPr/>
+        </p:nvSpPr>
+        <p:spPr>
+          <a:xfrm>
+            <a:off x="2264063" y="2544634"/>
+            <a:ext cx="1220639" cy="646331"/>
+          </a:xfrm>
+          <a:prstGeom prst="rect">
+            <a:avLst/>
+          </a:prstGeom>
+          <a:solidFill>
+            <a:schemeClr val="accent1"/>
+          </a:solidFill>
+          <a:ln>
+            <a:solidFill>
+              <a:schemeClr val="tx1"/>
+            </a:solidFill>
+          </a:ln>
+        </p:spPr>
+        <p:txBody>
+          <a:bodyPr wrap="square" rtlCol="0">
+            <a:spAutoFit/>
+          </a:bodyPr>
+          <a:lstStyle/>
+          <a:p>
             <a:pPr algn="ctr"/>
             <a:r>
               <a:rPr lang="en-US" dirty="0" smtClean="0"/>
-              <a:t>XL-320</a:t>
+              <a:t>Ultrasonic</a:t>
             </a:r>
           </a:p>
           <a:p>
             <a:pPr algn="ctr"/>
             <a:r>
               <a:rPr lang="en-US" dirty="0" smtClean="0"/>
-              <a:t>Servo</a:t>
+              <a:t>Sensor</a:t>
             </a:r>
             <a:endParaRPr lang="en-US" dirty="0"/>
           </a:p>
@@ -5830,14 +5255,16 @@
       </p:sp>
       <p:cxnSp>
         <p:nvCxnSpPr>
-          <p:cNvPr id="93" name="Straight Arrow Connector 92"/>
-          <p:cNvCxnSpPr/>
+          <p:cNvPr id="38" name="Straight Arrow Connector 37"/>
+          <p:cNvCxnSpPr>
+            <a:stCxn id="124" idx="1"/>
+          </p:cNvCxnSpPr>
           <p:nvPr/>
         </p:nvCxnSpPr>
         <p:spPr>
-          <a:xfrm>
-            <a:off x="4674633" y="4720856"/>
-            <a:ext cx="610442" cy="0"/>
+          <a:xfrm flipH="1" flipV="1">
+            <a:off x="4721639" y="2431359"/>
+            <a:ext cx="365766" cy="1"/>
           </a:xfrm>
           <a:prstGeom prst="straightConnector1">
             <a:avLst/>
@@ -5866,21 +5293,21 @@
       </p:cxnSp>
       <p:cxnSp>
         <p:nvCxnSpPr>
-          <p:cNvPr id="94" name="Straight Arrow Connector 93"/>
+          <p:cNvPr id="145" name="Straight Arrow Connector 144"/>
           <p:cNvCxnSpPr/>
           <p:nvPr/>
         </p:nvCxnSpPr>
         <p:spPr>
-          <a:xfrm>
-            <a:off x="6237674" y="4720856"/>
-            <a:ext cx="610442" cy="0"/>
+          <a:xfrm flipH="1" flipV="1">
+            <a:off x="4712112" y="2675539"/>
+            <a:ext cx="365766" cy="1"/>
           </a:xfrm>
           <a:prstGeom prst="straightConnector1">
             <a:avLst/>
           </a:prstGeom>
           <a:ln>
             <a:solidFill>
-              <a:srgbClr val="FF0000"/>
+              <a:schemeClr val="tx1"/>
             </a:solidFill>
             <a:tailEnd type="triangle"/>
           </a:ln>
@@ -5902,174 +5329,21 @@
       </p:cxnSp>
       <p:cxnSp>
         <p:nvCxnSpPr>
-          <p:cNvPr id="95" name="Straight Arrow Connector 94"/>
+          <p:cNvPr id="146" name="Straight Arrow Connector 145"/>
           <p:cNvCxnSpPr/>
           <p:nvPr/>
         </p:nvCxnSpPr>
         <p:spPr>
-          <a:xfrm>
-            <a:off x="7800638" y="4720856"/>
-            <a:ext cx="610442" cy="0"/>
+          <a:xfrm flipH="1" flipV="1">
+            <a:off x="4721639" y="2925603"/>
+            <a:ext cx="365766" cy="1"/>
           </a:xfrm>
           <a:prstGeom prst="straightConnector1">
             <a:avLst/>
           </a:prstGeom>
           <a:ln>
             <a:solidFill>
-              <a:srgbClr val="FF0000"/>
-            </a:solidFill>
-            <a:tailEnd type="triangle"/>
-          </a:ln>
-        </p:spPr>
-        <p:style>
-          <a:lnRef idx="1">
-            <a:schemeClr val="accent1"/>
-          </a:lnRef>
-          <a:fillRef idx="0">
-            <a:schemeClr val="accent1"/>
-          </a:fillRef>
-          <a:effectRef idx="0">
-            <a:schemeClr val="accent1"/>
-          </a:effectRef>
-          <a:fontRef idx="minor">
-            <a:schemeClr val="tx1"/>
-          </a:fontRef>
-        </p:style>
-      </p:cxnSp>
-      <p:sp>
-        <p:nvSpPr>
-          <p:cNvPr id="107" name="TextBox 106"/>
-          <p:cNvSpPr txBox="1"/>
-          <p:nvPr/>
-        </p:nvSpPr>
-        <p:spPr>
-          <a:xfrm flipH="1">
-            <a:off x="4697914" y="4430783"/>
-            <a:ext cx="846605" cy="307777"/>
-          </a:xfrm>
-          <a:prstGeom prst="rect">
-            <a:avLst/>
-          </a:prstGeom>
-          <a:noFill/>
-        </p:spPr>
-        <p:txBody>
-          <a:bodyPr wrap="square" rtlCol="0">
-            <a:spAutoFit/>
-          </a:bodyPr>
-          <a:lstStyle/>
-          <a:p>
-            <a:r>
-              <a:rPr lang="en-US" sz="1400" dirty="0" smtClean="0">
-                <a:solidFill>
-                  <a:srgbClr val="FF0000"/>
-                </a:solidFill>
-              </a:rPr>
-              <a:t>Vin</a:t>
-            </a:r>
-            <a:endParaRPr lang="en-US" sz="1400" dirty="0">
-              <a:solidFill>
-                <a:srgbClr val="FF0000"/>
-              </a:solidFill>
-            </a:endParaRPr>
-          </a:p>
-        </p:txBody>
-      </p:sp>
-      <p:sp>
-        <p:nvSpPr>
-          <p:cNvPr id="108" name="TextBox 107"/>
-          <p:cNvSpPr txBox="1"/>
-          <p:nvPr/>
-        </p:nvSpPr>
-        <p:spPr>
-          <a:xfrm flipH="1">
-            <a:off x="6237674" y="4445530"/>
-            <a:ext cx="846605" cy="307777"/>
-          </a:xfrm>
-          <a:prstGeom prst="rect">
-            <a:avLst/>
-          </a:prstGeom>
-          <a:noFill/>
-        </p:spPr>
-        <p:txBody>
-          <a:bodyPr wrap="square" rtlCol="0">
-            <a:spAutoFit/>
-          </a:bodyPr>
-          <a:lstStyle/>
-          <a:p>
-            <a:r>
-              <a:rPr lang="en-US" sz="1400" dirty="0" smtClean="0">
-                <a:solidFill>
-                  <a:srgbClr val="FF0000"/>
-                </a:solidFill>
-              </a:rPr>
-              <a:t>Vin</a:t>
-            </a:r>
-            <a:endParaRPr lang="en-US" sz="1400" dirty="0">
-              <a:solidFill>
-                <a:srgbClr val="FF0000"/>
-              </a:solidFill>
-            </a:endParaRPr>
-          </a:p>
-        </p:txBody>
-      </p:sp>
-      <p:sp>
-        <p:nvSpPr>
-          <p:cNvPr id="110" name="TextBox 109"/>
-          <p:cNvSpPr txBox="1"/>
-          <p:nvPr/>
-        </p:nvSpPr>
-        <p:spPr>
-          <a:xfrm flipH="1">
-            <a:off x="7800638" y="4445529"/>
-            <a:ext cx="846605" cy="307777"/>
-          </a:xfrm>
-          <a:prstGeom prst="rect">
-            <a:avLst/>
-          </a:prstGeom>
-          <a:noFill/>
-        </p:spPr>
-        <p:txBody>
-          <a:bodyPr wrap="square" rtlCol="0">
-            <a:spAutoFit/>
-          </a:bodyPr>
-          <a:lstStyle/>
-          <a:p>
-            <a:r>
-              <a:rPr lang="en-US" sz="1400" dirty="0" smtClean="0">
-                <a:solidFill>
-                  <a:srgbClr val="FF0000"/>
-                </a:solidFill>
-              </a:rPr>
-              <a:t>Vin</a:t>
-            </a:r>
-            <a:endParaRPr lang="en-US" sz="1400" dirty="0">
-              <a:solidFill>
-                <a:srgbClr val="FF0000"/>
-              </a:solidFill>
-            </a:endParaRPr>
-          </a:p>
-        </p:txBody>
-      </p:sp>
-      <p:cxnSp>
-        <p:nvCxnSpPr>
-          <p:cNvPr id="113" name="Straight Arrow Connector 112"/>
-          <p:cNvCxnSpPr>
-            <a:stCxn id="14" idx="3"/>
-            <a:endCxn id="80" idx="1"/>
-          </p:cNvCxnSpPr>
-          <p:nvPr/>
-        </p:nvCxnSpPr>
-        <p:spPr>
-          <a:xfrm>
-            <a:off x="4653842" y="4909837"/>
-            <a:ext cx="652499" cy="83"/>
-          </a:xfrm>
-          <a:prstGeom prst="straightConnector1">
-            <a:avLst/>
-          </a:prstGeom>
-          <a:ln>
-            <a:solidFill>
-              <a:schemeClr val="tx1"/>
+              <a:srgbClr val="7030A0"/>
             </a:solidFill>
             <a:tailEnd type="triangle"/>
           </a:ln>
@@ -6091,23 +5365,245 @@
       </p:cxnSp>
       <p:cxnSp>
         <p:nvCxnSpPr>
-          <p:cNvPr id="115" name="Straight Arrow Connector 114"/>
-          <p:cNvCxnSpPr>
-            <a:stCxn id="80" idx="3"/>
-          </p:cNvCxnSpPr>
+          <p:cNvPr id="147" name="Straight Arrow Connector 146"/>
+          <p:cNvCxnSpPr/>
           <p:nvPr/>
         </p:nvCxnSpPr>
         <p:spPr>
           <a:xfrm flipV="1">
-            <a:off x="6237674" y="4909836"/>
-            <a:ext cx="610442" cy="84"/>
+            <a:off x="4721639" y="3162175"/>
+            <a:ext cx="365766" cy="1"/>
           </a:xfrm>
           <a:prstGeom prst="straightConnector1">
             <a:avLst/>
           </a:prstGeom>
           <a:ln>
             <a:solidFill>
-              <a:schemeClr val="tx1"/>
+              <a:schemeClr val="accent2"/>
+            </a:solidFill>
+            <a:tailEnd type="triangle"/>
+          </a:ln>
+        </p:spPr>
+        <p:style>
+          <a:lnRef idx="1">
+            <a:schemeClr val="accent1"/>
+          </a:lnRef>
+          <a:fillRef idx="0">
+            <a:schemeClr val="accent1"/>
+          </a:fillRef>
+          <a:effectRef idx="0">
+            <a:schemeClr val="accent1"/>
+          </a:effectRef>
+          <a:fontRef idx="minor">
+            <a:schemeClr val="tx1"/>
+          </a:fontRef>
+        </p:style>
+      </p:cxnSp>
+      <p:sp>
+        <p:nvSpPr>
+          <p:cNvPr id="39" name="TextBox 38"/>
+          <p:cNvSpPr txBox="1"/>
+          <p:nvPr/>
+        </p:nvSpPr>
+        <p:spPr>
+          <a:xfrm>
+            <a:off x="4315015" y="3014018"/>
+            <a:ext cx="485518" cy="276999"/>
+          </a:xfrm>
+          <a:prstGeom prst="rect">
+            <a:avLst/>
+          </a:prstGeom>
+          <a:noFill/>
+        </p:spPr>
+        <p:txBody>
+          <a:bodyPr wrap="none" rtlCol="0">
+            <a:spAutoFit/>
+          </a:bodyPr>
+          <a:lstStyle/>
+          <a:p>
+            <a:r>
+              <a:rPr lang="en-US" sz="1200" dirty="0" smtClean="0">
+                <a:solidFill>
+                  <a:srgbClr val="FFC000"/>
+                </a:solidFill>
+              </a:rPr>
+              <a:t>Echo</a:t>
+            </a:r>
+            <a:endParaRPr lang="en-US" sz="1200" dirty="0">
+              <a:solidFill>
+                <a:srgbClr val="FFC000"/>
+              </a:solidFill>
+            </a:endParaRPr>
+          </a:p>
+        </p:txBody>
+      </p:sp>
+      <p:sp>
+        <p:nvSpPr>
+          <p:cNvPr id="40" name="TextBox 39"/>
+          <p:cNvSpPr txBox="1"/>
+          <p:nvPr/>
+        </p:nvSpPr>
+        <p:spPr>
+          <a:xfrm>
+            <a:off x="4361655" y="2774272"/>
+            <a:ext cx="438877" cy="276999"/>
+          </a:xfrm>
+          <a:prstGeom prst="rect">
+            <a:avLst/>
+          </a:prstGeom>
+          <a:noFill/>
+        </p:spPr>
+        <p:txBody>
+          <a:bodyPr wrap="square" rtlCol="0">
+            <a:spAutoFit/>
+          </a:bodyPr>
+          <a:lstStyle/>
+          <a:p>
+            <a:r>
+              <a:rPr lang="en-US" sz="1200" dirty="0" smtClean="0">
+                <a:solidFill>
+                  <a:srgbClr val="7030A0"/>
+                </a:solidFill>
+              </a:rPr>
+              <a:t>Trig</a:t>
+            </a:r>
+            <a:endParaRPr lang="en-US" sz="1200" dirty="0">
+              <a:solidFill>
+                <a:srgbClr val="7030A0"/>
+              </a:solidFill>
+            </a:endParaRPr>
+          </a:p>
+        </p:txBody>
+      </p:sp>
+      <p:sp>
+        <p:nvSpPr>
+          <p:cNvPr id="148" name="TextBox 147"/>
+          <p:cNvSpPr txBox="1"/>
+          <p:nvPr/>
+        </p:nvSpPr>
+        <p:spPr>
+          <a:xfrm>
+            <a:off x="1536366" y="2801459"/>
+            <a:ext cx="657386" cy="276999"/>
+          </a:xfrm>
+          <a:prstGeom prst="rect">
+            <a:avLst/>
+          </a:prstGeom>
+          <a:noFill/>
+        </p:spPr>
+        <p:txBody>
+          <a:bodyPr wrap="square" rtlCol="0">
+            <a:spAutoFit/>
+          </a:bodyPr>
+          <a:lstStyle/>
+          <a:p>
+            <a:r>
+              <a:rPr lang="en-US" sz="1200" dirty="0" smtClean="0">
+                <a:solidFill>
+                  <a:srgbClr val="7030A0"/>
+                </a:solidFill>
+              </a:rPr>
+              <a:t>Trig</a:t>
+            </a:r>
+            <a:endParaRPr lang="en-US" sz="1200" dirty="0">
+              <a:solidFill>
+                <a:srgbClr val="7030A0"/>
+              </a:solidFill>
+            </a:endParaRPr>
+          </a:p>
+        </p:txBody>
+      </p:sp>
+      <p:cxnSp>
+        <p:nvCxnSpPr>
+          <p:cNvPr id="149" name="Straight Arrow Connector 148"/>
+          <p:cNvCxnSpPr/>
+          <p:nvPr/>
+        </p:nvCxnSpPr>
+        <p:spPr>
+          <a:xfrm flipV="1">
+            <a:off x="1888786" y="2949772"/>
+            <a:ext cx="365766" cy="1"/>
+          </a:xfrm>
+          <a:prstGeom prst="straightConnector1">
+            <a:avLst/>
+          </a:prstGeom>
+          <a:ln>
+            <a:solidFill>
+              <a:srgbClr val="7030A0"/>
+            </a:solidFill>
+            <a:tailEnd type="triangle"/>
+          </a:ln>
+        </p:spPr>
+        <p:style>
+          <a:lnRef idx="1">
+            <a:schemeClr val="accent1"/>
+          </a:lnRef>
+          <a:fillRef idx="0">
+            <a:schemeClr val="accent1"/>
+          </a:fillRef>
+          <a:effectRef idx="0">
+            <a:schemeClr val="accent1"/>
+          </a:effectRef>
+          <a:fontRef idx="minor">
+            <a:schemeClr val="tx1"/>
+          </a:fontRef>
+        </p:style>
+      </p:cxnSp>
+      <p:sp>
+        <p:nvSpPr>
+          <p:cNvPr id="150" name="TextBox 149"/>
+          <p:cNvSpPr txBox="1"/>
+          <p:nvPr/>
+        </p:nvSpPr>
+        <p:spPr>
+          <a:xfrm>
+            <a:off x="3834098" y="3025134"/>
+            <a:ext cx="485518" cy="276999"/>
+          </a:xfrm>
+          <a:prstGeom prst="rect">
+            <a:avLst/>
+          </a:prstGeom>
+          <a:noFill/>
+        </p:spPr>
+        <p:txBody>
+          <a:bodyPr wrap="none" rtlCol="0">
+            <a:spAutoFit/>
+          </a:bodyPr>
+          <a:lstStyle/>
+          <a:p>
+            <a:r>
+              <a:rPr lang="en-US" sz="1200" dirty="0" smtClean="0">
+                <a:solidFill>
+                  <a:srgbClr val="FFC000"/>
+                </a:solidFill>
+              </a:rPr>
+              <a:t>Echo</a:t>
+            </a:r>
+            <a:endParaRPr lang="en-US" sz="1200" dirty="0">
+              <a:solidFill>
+                <a:srgbClr val="FFC000"/>
+              </a:solidFill>
+            </a:endParaRPr>
+          </a:p>
+        </p:txBody>
+      </p:sp>
+      <p:cxnSp>
+        <p:nvCxnSpPr>
+          <p:cNvPr id="155" name="Straight Arrow Connector 154"/>
+          <p:cNvCxnSpPr/>
+          <p:nvPr/>
+        </p:nvCxnSpPr>
+        <p:spPr>
+          <a:xfrm flipV="1">
+            <a:off x="3515134" y="3134932"/>
+            <a:ext cx="365766" cy="1"/>
+          </a:xfrm>
+          <a:prstGeom prst="straightConnector1">
+            <a:avLst/>
+          </a:prstGeom>
+          <a:ln>
+            <a:solidFill>
+              <a:schemeClr val="accent2"/>
             </a:solidFill>
             <a:tailEnd type="triangle"/>
           </a:ln>
@@ -6129,21 +5625,21 @@
       </p:cxnSp>
       <p:cxnSp>
         <p:nvCxnSpPr>
-          <p:cNvPr id="116" name="Straight Arrow Connector 115"/>
+          <p:cNvPr id="156" name="Straight Arrow Connector 155"/>
           <p:cNvCxnSpPr/>
           <p:nvPr/>
         </p:nvCxnSpPr>
         <p:spPr>
           <a:xfrm flipV="1">
-            <a:off x="7821904" y="4922584"/>
-            <a:ext cx="610442" cy="84"/>
+            <a:off x="1889356" y="2642606"/>
+            <a:ext cx="365766" cy="1"/>
           </a:xfrm>
           <a:prstGeom prst="straightConnector1">
             <a:avLst/>
           </a:prstGeom>
           <a:ln>
             <a:solidFill>
-              <a:schemeClr val="tx1"/>
+              <a:srgbClr val="FF0000"/>
             </a:solidFill>
             <a:tailEnd type="triangle"/>
           </a:ln>
@@ -6165,14 +5661,14 @@
       </p:cxnSp>
       <p:sp>
         <p:nvSpPr>
-          <p:cNvPr id="117" name="TextBox 116"/>
+          <p:cNvPr id="42" name="TextBox 41"/>
           <p:cNvSpPr txBox="1"/>
           <p:nvPr/>
         </p:nvSpPr>
         <p:spPr>
-          <a:xfrm flipH="1">
-            <a:off x="4597387" y="4667691"/>
-            <a:ext cx="846605" cy="307777"/>
+          <a:xfrm>
+            <a:off x="1614884" y="2508648"/>
+            <a:ext cx="360661" cy="276999"/>
           </a:xfrm>
           <a:prstGeom prst="rect">
             <a:avLst/>
@@ -6186,23 +5682,67 @@
           <a:lstStyle/>
           <a:p>
             <a:r>
-              <a:rPr lang="en-US" sz="1400" dirty="0" smtClean="0"/>
-              <a:t>Ground</a:t>
-            </a:r>
-            <a:endParaRPr lang="en-US" sz="1400" dirty="0"/>
-          </a:p>
-        </p:txBody>
-      </p:sp>
-      <p:sp>
-        <p:nvSpPr>
-          <p:cNvPr id="119" name="TextBox 118"/>
+              <a:rPr lang="en-US" sz="1200" dirty="0" smtClean="0">
+                <a:solidFill>
+                  <a:srgbClr val="FF0000"/>
+                </a:solidFill>
+              </a:rPr>
+              <a:t>5V</a:t>
+            </a:r>
+            <a:endParaRPr lang="en-US" sz="1200" dirty="0">
+              <a:solidFill>
+                <a:srgbClr val="FF0000"/>
+              </a:solidFill>
+            </a:endParaRPr>
+          </a:p>
+        </p:txBody>
+      </p:sp>
+      <p:cxnSp>
+        <p:nvCxnSpPr>
+          <p:cNvPr id="160" name="Straight Arrow Connector 159"/>
+          <p:cNvCxnSpPr/>
+          <p:nvPr/>
+        </p:nvCxnSpPr>
+        <p:spPr>
+          <a:xfrm flipV="1">
+            <a:off x="1889514" y="2799113"/>
+            <a:ext cx="365766" cy="1"/>
+          </a:xfrm>
+          <a:prstGeom prst="straightConnector1">
+            <a:avLst/>
+          </a:prstGeom>
+          <a:ln>
+            <a:solidFill>
+              <a:schemeClr val="tx1"/>
+            </a:solidFill>
+            <a:tailEnd type="triangle"/>
+          </a:ln>
+        </p:spPr>
+        <p:style>
+          <a:lnRef idx="1">
+            <a:schemeClr val="accent1"/>
+          </a:lnRef>
+          <a:fillRef idx="0">
+            <a:schemeClr val="accent1"/>
+          </a:fillRef>
+          <a:effectRef idx="0">
+            <a:schemeClr val="accent1"/>
+          </a:effectRef>
+          <a:fontRef idx="minor">
+            <a:schemeClr val="tx1"/>
+          </a:fontRef>
+        </p:style>
+      </p:cxnSp>
+      <p:sp>
+        <p:nvSpPr>
+          <p:cNvPr id="44" name="TextBox 43"/>
           <p:cNvSpPr txBox="1"/>
           <p:nvPr/>
         </p:nvSpPr>
         <p:spPr>
-          <a:xfrm flipH="1">
-            <a:off x="6162124" y="4660600"/>
-            <a:ext cx="846605" cy="307777"/>
+          <a:xfrm>
+            <a:off x="1489043" y="2664098"/>
+            <a:ext cx="488094" cy="276999"/>
           </a:xfrm>
           <a:prstGeom prst="rect">
             <a:avLst/>
@@ -6216,23 +5756,59 @@
           <a:lstStyle/>
           <a:p>
             <a:r>
-              <a:rPr lang="en-US" sz="1400" dirty="0" smtClean="0"/>
-              <a:t>Ground</a:t>
-            </a:r>
-            <a:endParaRPr lang="en-US" sz="1400" dirty="0"/>
-          </a:p>
-        </p:txBody>
-      </p:sp>
-      <p:sp>
-        <p:nvSpPr>
-          <p:cNvPr id="120" name="TextBox 119"/>
+              <a:rPr lang="en-US" sz="1200" dirty="0" smtClean="0"/>
+              <a:t>GND</a:t>
+            </a:r>
+            <a:endParaRPr lang="en-US" sz="1200" dirty="0"/>
+          </a:p>
+        </p:txBody>
+      </p:sp>
+      <p:cxnSp>
+        <p:nvCxnSpPr>
+          <p:cNvPr id="164" name="Straight Arrow Connector 163"/>
+          <p:cNvCxnSpPr/>
+          <p:nvPr/>
+        </p:nvCxnSpPr>
+        <p:spPr>
+          <a:xfrm rot="10800000" flipH="1" flipV="1">
+            <a:off x="1635537" y="3321778"/>
+            <a:ext cx="365766" cy="1"/>
+          </a:xfrm>
+          <a:prstGeom prst="straightConnector1">
+            <a:avLst/>
+          </a:prstGeom>
+          <a:ln>
+            <a:solidFill>
+              <a:srgbClr val="FF0000"/>
+            </a:solidFill>
+            <a:tailEnd type="triangle"/>
+          </a:ln>
+        </p:spPr>
+        <p:style>
+          <a:lnRef idx="1">
+            <a:schemeClr val="accent1"/>
+          </a:lnRef>
+          <a:fillRef idx="0">
+            <a:schemeClr val="accent1"/>
+          </a:fillRef>
+          <a:effectRef idx="0">
+            <a:schemeClr val="accent1"/>
+          </a:effectRef>
+          <a:fontRef idx="minor">
+            <a:schemeClr val="tx1"/>
+          </a:fontRef>
+        </p:style>
+      </p:cxnSp>
+      <p:sp>
+        <p:nvSpPr>
+          <p:cNvPr id="166" name="TextBox 165"/>
           <p:cNvSpPr txBox="1"/>
           <p:nvPr/>
         </p:nvSpPr>
         <p:spPr>
-          <a:xfrm flipH="1">
-            <a:off x="7746354" y="4667691"/>
-            <a:ext cx="846605" cy="307777"/>
+          <a:xfrm>
+            <a:off x="1379768" y="3187654"/>
+            <a:ext cx="360661" cy="276999"/>
           </a:xfrm>
           <a:prstGeom prst="rect">
             <a:avLst/>
@@ -6246,23 +5822,67 @@
           <a:lstStyle/>
           <a:p>
             <a:r>
-              <a:rPr lang="en-US" sz="1400" dirty="0" smtClean="0"/>
-              <a:t>Ground</a:t>
-            </a:r>
-            <a:endParaRPr lang="en-US" sz="1400" dirty="0"/>
-          </a:p>
-        </p:txBody>
-      </p:sp>
-      <p:sp>
-        <p:nvSpPr>
-          <p:cNvPr id="122" name="TextBox 121"/>
+              <a:rPr lang="en-US" sz="1200" dirty="0" smtClean="0">
+                <a:solidFill>
+                  <a:srgbClr val="FF0000"/>
+                </a:solidFill>
+              </a:rPr>
+              <a:t>5V</a:t>
+            </a:r>
+            <a:endParaRPr lang="en-US" sz="1200" dirty="0">
+              <a:solidFill>
+                <a:srgbClr val="FF0000"/>
+              </a:solidFill>
+            </a:endParaRPr>
+          </a:p>
+        </p:txBody>
+      </p:sp>
+      <p:cxnSp>
+        <p:nvCxnSpPr>
+          <p:cNvPr id="167" name="Straight Arrow Connector 166"/>
+          <p:cNvCxnSpPr/>
+          <p:nvPr/>
+        </p:nvCxnSpPr>
+        <p:spPr>
+          <a:xfrm flipV="1">
+            <a:off x="1651151" y="3542796"/>
+            <a:ext cx="365766" cy="1"/>
+          </a:xfrm>
+          <a:prstGeom prst="straightConnector1">
+            <a:avLst/>
+          </a:prstGeom>
+          <a:ln>
+            <a:solidFill>
+              <a:schemeClr val="tx1"/>
+            </a:solidFill>
+            <a:tailEnd type="triangle"/>
+          </a:ln>
+        </p:spPr>
+        <p:style>
+          <a:lnRef idx="1">
+            <a:schemeClr val="accent1"/>
+          </a:lnRef>
+          <a:fillRef idx="0">
+            <a:schemeClr val="accent1"/>
+          </a:fillRef>
+          <a:effectRef idx="0">
+            <a:schemeClr val="accent1"/>
+          </a:effectRef>
+          <a:fontRef idx="minor">
+            <a:schemeClr val="tx1"/>
+          </a:fontRef>
+        </p:style>
+      </p:cxnSp>
+      <p:sp>
+        <p:nvSpPr>
+          <p:cNvPr id="168" name="TextBox 167"/>
           <p:cNvSpPr txBox="1"/>
           <p:nvPr/>
         </p:nvSpPr>
         <p:spPr>
-          <a:xfrm flipH="1">
-            <a:off x="4649575" y="4922910"/>
-            <a:ext cx="846605" cy="307777"/>
+          <a:xfrm>
+            <a:off x="1255024" y="3403299"/>
+            <a:ext cx="488094" cy="276999"/>
           </a:xfrm>
           <a:prstGeom prst="rect">
             <a:avLst/>
@@ -6275,6 +5895,462 @@
           </a:bodyPr>
           <a:lstStyle/>
           <a:p>
+            <a:r>
+              <a:rPr lang="en-US" sz="1200" dirty="0" smtClean="0"/>
+              <a:t>GND</a:t>
+            </a:r>
+            <a:endParaRPr lang="en-US" sz="1200" dirty="0"/>
+          </a:p>
+        </p:txBody>
+      </p:sp>
+      <p:sp>
+        <p:nvSpPr>
+          <p:cNvPr id="176" name="TextBox 175"/>
+          <p:cNvSpPr txBox="1"/>
+          <p:nvPr/>
+        </p:nvSpPr>
+        <p:spPr>
+          <a:xfrm>
+            <a:off x="1989780" y="3238183"/>
+            <a:ext cx="1510257" cy="369332"/>
+          </a:xfrm>
+          <a:prstGeom prst="rect">
+            <a:avLst/>
+          </a:prstGeom>
+          <a:solidFill>
+            <a:schemeClr val="accent1"/>
+          </a:solidFill>
+          <a:ln>
+            <a:solidFill>
+              <a:schemeClr val="tx1"/>
+            </a:solidFill>
+          </a:ln>
+        </p:spPr>
+        <p:txBody>
+          <a:bodyPr wrap="square" rtlCol="0">
+            <a:spAutoFit/>
+          </a:bodyPr>
+          <a:lstStyle/>
+          <a:p>
+            <a:pPr algn="ctr"/>
+            <a:r>
+              <a:rPr lang="en-US" dirty="0" smtClean="0"/>
+              <a:t>Switch</a:t>
+            </a:r>
+            <a:endParaRPr lang="en-US" dirty="0"/>
+          </a:p>
+        </p:txBody>
+      </p:sp>
+      <p:sp>
+        <p:nvSpPr>
+          <p:cNvPr id="48" name="TextBox 47"/>
+          <p:cNvSpPr txBox="1"/>
+          <p:nvPr/>
+        </p:nvSpPr>
+        <p:spPr>
+          <a:xfrm>
+            <a:off x="1935340" y="3193037"/>
+            <a:ext cx="403806" cy="276999"/>
+          </a:xfrm>
+          <a:prstGeom prst="rect">
+            <a:avLst/>
+          </a:prstGeom>
+          <a:noFill/>
+        </p:spPr>
+        <p:txBody>
+          <a:bodyPr wrap="square" rtlCol="0">
+            <a:spAutoFit/>
+          </a:bodyPr>
+          <a:lstStyle/>
+          <a:p>
+            <a:r>
+              <a:rPr lang="en-US" sz="1200" dirty="0" smtClean="0"/>
+              <a:t>NC</a:t>
+            </a:r>
+            <a:endParaRPr lang="en-US" sz="1200" dirty="0"/>
+          </a:p>
+        </p:txBody>
+      </p:sp>
+      <p:sp>
+        <p:nvSpPr>
+          <p:cNvPr id="177" name="TextBox 176"/>
+          <p:cNvSpPr txBox="1"/>
+          <p:nvPr/>
+        </p:nvSpPr>
+        <p:spPr>
+          <a:xfrm>
+            <a:off x="1935340" y="3400689"/>
+            <a:ext cx="403806" cy="276999"/>
+          </a:xfrm>
+          <a:prstGeom prst="rect">
+            <a:avLst/>
+          </a:prstGeom>
+          <a:noFill/>
+        </p:spPr>
+        <p:txBody>
+          <a:bodyPr wrap="square" rtlCol="0">
+            <a:spAutoFit/>
+          </a:bodyPr>
+          <a:lstStyle/>
+          <a:p>
+            <a:r>
+              <a:rPr lang="en-US" sz="1200" dirty="0" smtClean="0"/>
+              <a:t>NO</a:t>
+            </a:r>
+            <a:endParaRPr lang="en-US" sz="1200" dirty="0"/>
+          </a:p>
+        </p:txBody>
+      </p:sp>
+      <p:sp>
+        <p:nvSpPr>
+          <p:cNvPr id="178" name="TextBox 177"/>
+          <p:cNvSpPr txBox="1"/>
+          <p:nvPr/>
+        </p:nvSpPr>
+        <p:spPr>
+          <a:xfrm>
+            <a:off x="4445279" y="2308249"/>
+            <a:ext cx="362287" cy="276999"/>
+          </a:xfrm>
+          <a:prstGeom prst="rect">
+            <a:avLst/>
+          </a:prstGeom>
+          <a:noFill/>
+        </p:spPr>
+        <p:txBody>
+          <a:bodyPr wrap="square" rtlCol="0">
+            <a:spAutoFit/>
+          </a:bodyPr>
+          <a:lstStyle/>
+          <a:p>
+            <a:r>
+              <a:rPr lang="en-US" sz="1200" dirty="0" smtClean="0">
+                <a:solidFill>
+                  <a:srgbClr val="FF0000"/>
+                </a:solidFill>
+              </a:rPr>
+              <a:t>5V</a:t>
+            </a:r>
+            <a:endParaRPr lang="en-US" sz="1200" dirty="0">
+              <a:solidFill>
+                <a:srgbClr val="FF0000"/>
+              </a:solidFill>
+            </a:endParaRPr>
+          </a:p>
+        </p:txBody>
+      </p:sp>
+      <p:sp>
+        <p:nvSpPr>
+          <p:cNvPr id="179" name="TextBox 178"/>
+          <p:cNvSpPr txBox="1"/>
+          <p:nvPr/>
+        </p:nvSpPr>
+        <p:spPr>
+          <a:xfrm>
+            <a:off x="4316506" y="2530318"/>
+            <a:ext cx="488094" cy="276999"/>
+          </a:xfrm>
+          <a:prstGeom prst="rect">
+            <a:avLst/>
+          </a:prstGeom>
+          <a:noFill/>
+        </p:spPr>
+        <p:txBody>
+          <a:bodyPr wrap="square" rtlCol="0">
+            <a:spAutoFit/>
+          </a:bodyPr>
+          <a:lstStyle/>
+          <a:p>
+            <a:r>
+              <a:rPr lang="en-US" sz="1200" dirty="0" smtClean="0"/>
+              <a:t>GND</a:t>
+            </a:r>
+            <a:endParaRPr lang="en-US" sz="1200" dirty="0"/>
+          </a:p>
+        </p:txBody>
+      </p:sp>
+      <p:cxnSp>
+        <p:nvCxnSpPr>
+          <p:cNvPr id="180" name="Straight Arrow Connector 179"/>
+          <p:cNvCxnSpPr/>
+          <p:nvPr/>
+        </p:nvCxnSpPr>
+        <p:spPr>
+          <a:xfrm flipV="1">
+            <a:off x="3533379" y="3416454"/>
+            <a:ext cx="365766" cy="1"/>
+          </a:xfrm>
+          <a:prstGeom prst="straightConnector1">
+            <a:avLst/>
+          </a:prstGeom>
+          <a:ln>
+            <a:solidFill>
+              <a:srgbClr val="00B050"/>
+            </a:solidFill>
+            <a:tailEnd type="triangle"/>
+          </a:ln>
+        </p:spPr>
+        <p:style>
+          <a:lnRef idx="1">
+            <a:schemeClr val="accent1"/>
+          </a:lnRef>
+          <a:fillRef idx="0">
+            <a:schemeClr val="accent1"/>
+          </a:fillRef>
+          <a:effectRef idx="0">
+            <a:schemeClr val="accent1"/>
+          </a:effectRef>
+          <a:fontRef idx="minor">
+            <a:schemeClr val="tx1"/>
+          </a:fontRef>
+        </p:style>
+      </p:cxnSp>
+      <p:sp>
+        <p:nvSpPr>
+          <p:cNvPr id="181" name="TextBox 180"/>
+          <p:cNvSpPr txBox="1"/>
+          <p:nvPr/>
+        </p:nvSpPr>
+        <p:spPr>
+          <a:xfrm>
+            <a:off x="3831126" y="3275322"/>
+            <a:ext cx="503536" cy="276999"/>
+          </a:xfrm>
+          <a:prstGeom prst="rect">
+            <a:avLst/>
+          </a:prstGeom>
+          <a:noFill/>
+        </p:spPr>
+        <p:txBody>
+          <a:bodyPr wrap="none" rtlCol="0">
+            <a:spAutoFit/>
+          </a:bodyPr>
+          <a:lstStyle/>
+          <a:p>
+            <a:r>
+              <a:rPr lang="en-US" sz="1200" dirty="0" smtClean="0">
+                <a:solidFill>
+                  <a:srgbClr val="00B050"/>
+                </a:solidFill>
+              </a:rPr>
+              <a:t>State</a:t>
+            </a:r>
+            <a:endParaRPr lang="en-US" sz="1200" dirty="0">
+              <a:solidFill>
+                <a:srgbClr val="00B050"/>
+              </a:solidFill>
+            </a:endParaRPr>
+          </a:p>
+        </p:txBody>
+      </p:sp>
+      <p:sp>
+        <p:nvSpPr>
+          <p:cNvPr id="182" name="TextBox 181"/>
+          <p:cNvSpPr txBox="1"/>
+          <p:nvPr/>
+        </p:nvSpPr>
+        <p:spPr>
+          <a:xfrm>
+            <a:off x="4279567" y="3276175"/>
+            <a:ext cx="503536" cy="276999"/>
+          </a:xfrm>
+          <a:prstGeom prst="rect">
+            <a:avLst/>
+          </a:prstGeom>
+          <a:noFill/>
+        </p:spPr>
+        <p:txBody>
+          <a:bodyPr wrap="none" rtlCol="0">
+            <a:spAutoFit/>
+          </a:bodyPr>
+          <a:lstStyle/>
+          <a:p>
+            <a:r>
+              <a:rPr lang="en-US" sz="1200" dirty="0" smtClean="0">
+                <a:solidFill>
+                  <a:srgbClr val="00B050"/>
+                </a:solidFill>
+              </a:rPr>
+              <a:t>State</a:t>
+            </a:r>
+            <a:endParaRPr lang="en-US" sz="1200" dirty="0">
+              <a:solidFill>
+                <a:srgbClr val="00B050"/>
+              </a:solidFill>
+            </a:endParaRPr>
+          </a:p>
+        </p:txBody>
+      </p:sp>
+      <p:cxnSp>
+        <p:nvCxnSpPr>
+          <p:cNvPr id="183" name="Straight Arrow Connector 182"/>
+          <p:cNvCxnSpPr/>
+          <p:nvPr/>
+        </p:nvCxnSpPr>
+        <p:spPr>
+          <a:xfrm flipV="1">
+            <a:off x="4715534" y="3433724"/>
+            <a:ext cx="365766" cy="1"/>
+          </a:xfrm>
+          <a:prstGeom prst="straightConnector1">
+            <a:avLst/>
+          </a:prstGeom>
+          <a:ln>
+            <a:solidFill>
+              <a:srgbClr val="00B050"/>
+            </a:solidFill>
+            <a:tailEnd type="triangle"/>
+          </a:ln>
+        </p:spPr>
+        <p:style>
+          <a:lnRef idx="1">
+            <a:schemeClr val="accent1"/>
+          </a:lnRef>
+          <a:fillRef idx="0">
+            <a:schemeClr val="accent1"/>
+          </a:fillRef>
+          <a:effectRef idx="0">
+            <a:schemeClr val="accent1"/>
+          </a:effectRef>
+          <a:fontRef idx="minor">
+            <a:schemeClr val="tx1"/>
+          </a:fontRef>
+        </p:style>
+      </p:cxnSp>
+      <p:cxnSp>
+        <p:nvCxnSpPr>
+          <p:cNvPr id="107" name="Straight Arrow Connector 106"/>
+          <p:cNvCxnSpPr/>
+          <p:nvPr/>
+        </p:nvCxnSpPr>
+        <p:spPr>
+          <a:xfrm rot="16200000">
+            <a:off x="8825919" y="4834448"/>
+            <a:ext cx="0" cy="711487"/>
+          </a:xfrm>
+          <a:prstGeom prst="straightConnector1">
+            <a:avLst/>
+          </a:prstGeom>
+          <a:ln>
+            <a:solidFill>
+              <a:schemeClr val="accent2">
+                <a:lumMod val="75000"/>
+              </a:schemeClr>
+            </a:solidFill>
+            <a:headEnd type="triangle"/>
+            <a:tailEnd type="triangle"/>
+          </a:ln>
+        </p:spPr>
+        <p:style>
+          <a:lnRef idx="1">
+            <a:schemeClr val="accent1"/>
+          </a:lnRef>
+          <a:fillRef idx="0">
+            <a:schemeClr val="accent1"/>
+          </a:fillRef>
+          <a:effectRef idx="0">
+            <a:schemeClr val="accent1"/>
+          </a:effectRef>
+          <a:fontRef idx="minor">
+            <a:schemeClr val="tx1"/>
+          </a:fontRef>
+        </p:style>
+      </p:cxnSp>
+      <p:cxnSp>
+        <p:nvCxnSpPr>
+          <p:cNvPr id="108" name="Straight Arrow Connector 107"/>
+          <p:cNvCxnSpPr/>
+          <p:nvPr/>
+        </p:nvCxnSpPr>
+        <p:spPr>
+          <a:xfrm rot="16200000">
+            <a:off x="8841577" y="4252047"/>
+            <a:ext cx="0" cy="711487"/>
+          </a:xfrm>
+          <a:prstGeom prst="straightConnector1">
+            <a:avLst/>
+          </a:prstGeom>
+          <a:ln>
+            <a:solidFill>
+              <a:srgbClr val="FF0000"/>
+            </a:solidFill>
+            <a:tailEnd type="triangle"/>
+          </a:ln>
+        </p:spPr>
+        <p:style>
+          <a:lnRef idx="1">
+            <a:schemeClr val="accent1"/>
+          </a:lnRef>
+          <a:fillRef idx="0">
+            <a:schemeClr val="accent1"/>
+          </a:fillRef>
+          <a:effectRef idx="0">
+            <a:schemeClr val="accent1"/>
+          </a:effectRef>
+          <a:fontRef idx="minor">
+            <a:schemeClr val="tx1"/>
+          </a:fontRef>
+        </p:style>
+      </p:cxnSp>
+      <p:cxnSp>
+        <p:nvCxnSpPr>
+          <p:cNvPr id="110" name="Straight Arrow Connector 109"/>
+          <p:cNvCxnSpPr/>
+          <p:nvPr/>
+        </p:nvCxnSpPr>
+        <p:spPr>
+          <a:xfrm rot="16200000">
+            <a:off x="8834850" y="4543248"/>
+            <a:ext cx="0" cy="711487"/>
+          </a:xfrm>
+          <a:prstGeom prst="straightConnector1">
+            <a:avLst/>
+          </a:prstGeom>
+          <a:ln>
+            <a:solidFill>
+              <a:schemeClr val="tx1"/>
+            </a:solidFill>
+            <a:tailEnd type="triangle"/>
+          </a:ln>
+        </p:spPr>
+        <p:style>
+          <a:lnRef idx="1">
+            <a:schemeClr val="accent1"/>
+          </a:lnRef>
+          <a:fillRef idx="0">
+            <a:schemeClr val="accent1"/>
+          </a:fillRef>
+          <a:effectRef idx="0">
+            <a:schemeClr val="accent1"/>
+          </a:effectRef>
+          <a:fontRef idx="minor">
+            <a:schemeClr val="tx1"/>
+          </a:fontRef>
+        </p:style>
+      </p:cxnSp>
+      <p:sp>
+        <p:nvSpPr>
+          <p:cNvPr id="113" name="TextBox 112"/>
+          <p:cNvSpPr txBox="1"/>
+          <p:nvPr/>
+        </p:nvSpPr>
+        <p:spPr>
+          <a:xfrm flipH="1">
+            <a:off x="8528470" y="4913768"/>
+            <a:ext cx="612759" cy="307777"/>
+          </a:xfrm>
+          <a:prstGeom prst="rect">
+            <a:avLst/>
+          </a:prstGeom>
+          <a:noFill/>
+        </p:spPr>
+        <p:txBody>
+          <a:bodyPr wrap="square" rtlCol="0">
+            <a:spAutoFit/>
+          </a:bodyPr>
+          <a:lstStyle/>
+          <a:p>
+            <a:pPr algn="ctr"/>
             <a:r>
               <a:rPr lang="en-US" sz="1400" dirty="0" smtClean="0">
                 <a:solidFill>
@@ -6295,16 +6371,86 @@
           </a:p>
         </p:txBody>
       </p:sp>
+      <p:sp>
+        <p:nvSpPr>
+          <p:cNvPr id="115" name="TextBox 114"/>
+          <p:cNvSpPr txBox="1"/>
+          <p:nvPr/>
+        </p:nvSpPr>
+        <p:spPr>
+          <a:xfrm flipH="1">
+            <a:off x="8402615" y="4591215"/>
+            <a:ext cx="779047" cy="307777"/>
+          </a:xfrm>
+          <a:prstGeom prst="rect">
+            <a:avLst/>
+          </a:prstGeom>
+          <a:noFill/>
+        </p:spPr>
+        <p:txBody>
+          <a:bodyPr wrap="square" rtlCol="0">
+            <a:spAutoFit/>
+          </a:bodyPr>
+          <a:lstStyle/>
+          <a:p>
+            <a:pPr algn="ctr"/>
+            <a:r>
+              <a:rPr lang="en-US" sz="1400" dirty="0" smtClean="0"/>
+              <a:t>Ground</a:t>
+            </a:r>
+            <a:endParaRPr lang="en-US" sz="1400" dirty="0"/>
+          </a:p>
+        </p:txBody>
+      </p:sp>
+      <p:sp>
+        <p:nvSpPr>
+          <p:cNvPr id="116" name="TextBox 115"/>
+          <p:cNvSpPr txBox="1"/>
+          <p:nvPr/>
+        </p:nvSpPr>
+        <p:spPr>
+          <a:xfrm flipH="1">
+            <a:off x="8553245" y="4269695"/>
+            <a:ext cx="477788" cy="317338"/>
+          </a:xfrm>
+          <a:prstGeom prst="rect">
+            <a:avLst/>
+          </a:prstGeom>
+          <a:noFill/>
+        </p:spPr>
+        <p:txBody>
+          <a:bodyPr wrap="square" rtlCol="0">
+            <a:spAutoFit/>
+          </a:bodyPr>
+          <a:lstStyle/>
+          <a:p>
+            <a:pPr algn="ctr"/>
+            <a:r>
+              <a:rPr lang="en-US" sz="1400" dirty="0" smtClean="0">
+                <a:solidFill>
+                  <a:srgbClr val="FF0000"/>
+                </a:solidFill>
+              </a:rPr>
+              <a:t>Vin</a:t>
+            </a:r>
+            <a:endParaRPr lang="en-US" sz="1400" dirty="0">
+              <a:solidFill>
+                <a:srgbClr val="FF0000"/>
+              </a:solidFill>
+            </a:endParaRPr>
+          </a:p>
+        </p:txBody>
+      </p:sp>
       <p:cxnSp>
         <p:nvCxnSpPr>
-          <p:cNvPr id="124" name="Straight Arrow Connector 123"/>
+          <p:cNvPr id="117" name="Straight Arrow Connector 116"/>
           <p:cNvCxnSpPr/>
           <p:nvPr/>
         </p:nvCxnSpPr>
         <p:spPr>
-          <a:xfrm flipH="1">
-            <a:off x="4653842" y="5183269"/>
-            <a:ext cx="652499" cy="0"/>
+          <a:xfrm rot="16200000">
+            <a:off x="10598493" y="4834447"/>
+            <a:ext cx="0" cy="711487"/>
           </a:xfrm>
           <a:prstGeom prst="straightConnector1">
             <a:avLst/>
@@ -6336,25 +6482,22 @@
       </p:cxnSp>
       <p:cxnSp>
         <p:nvCxnSpPr>
-          <p:cNvPr id="125" name="Straight Arrow Connector 124"/>
+          <p:cNvPr id="118" name="Straight Arrow Connector 117"/>
           <p:cNvCxnSpPr/>
           <p:nvPr/>
         </p:nvCxnSpPr>
         <p:spPr>
-          <a:xfrm flipH="1">
-            <a:off x="6216806" y="5183269"/>
-            <a:ext cx="652499" cy="0"/>
+          <a:xfrm rot="16200000">
+            <a:off x="10614151" y="4252046"/>
+            <a:ext cx="0" cy="711487"/>
           </a:xfrm>
           <a:prstGeom prst="straightConnector1">
             <a:avLst/>
           </a:prstGeom>
           <a:ln>
             <a:solidFill>
-              <a:schemeClr val="accent2">
-                <a:lumMod val="75000"/>
-              </a:schemeClr>
-            </a:solidFill>
-            <a:headEnd type="triangle"/>
+              <a:srgbClr val="FF0000"/>
+            </a:solidFill>
             <a:tailEnd type="triangle"/>
           </a:ln>
         </p:spPr>
@@ -6375,25 +6518,22 @@
       </p:cxnSp>
       <p:cxnSp>
         <p:nvCxnSpPr>
-          <p:cNvPr id="127" name="Straight Arrow Connector 126"/>
+          <p:cNvPr id="119" name="Straight Arrow Connector 118"/>
           <p:cNvCxnSpPr/>
           <p:nvPr/>
         </p:nvCxnSpPr>
         <p:spPr>
-          <a:xfrm flipH="1">
-            <a:off x="7775064" y="5183269"/>
-            <a:ext cx="652499" cy="0"/>
+          <a:xfrm rot="16200000">
+            <a:off x="10607424" y="4543247"/>
+            <a:ext cx="0" cy="711487"/>
           </a:xfrm>
           <a:prstGeom prst="straightConnector1">
             <a:avLst/>
           </a:prstGeom>
           <a:ln>
             <a:solidFill>
-              <a:schemeClr val="accent2">
-                <a:lumMod val="75000"/>
-              </a:schemeClr>
-            </a:solidFill>
-            <a:headEnd type="triangle"/>
+              <a:schemeClr val="tx1"/>
+            </a:solidFill>
             <a:tailEnd type="triangle"/>
           </a:ln>
         </p:spPr>
@@ -6414,14 +6554,14 @@
       </p:cxnSp>
       <p:sp>
         <p:nvSpPr>
-          <p:cNvPr id="130" name="TextBox 129"/>
+          <p:cNvPr id="120" name="TextBox 119"/>
           <p:cNvSpPr txBox="1"/>
           <p:nvPr/>
         </p:nvSpPr>
         <p:spPr>
           <a:xfrm flipH="1">
-            <a:off x="6247187" y="4915241"/>
-            <a:ext cx="846605" cy="307777"/>
+            <a:off x="10301044" y="4913767"/>
+            <a:ext cx="612759" cy="307777"/>
           </a:xfrm>
           <a:prstGeom prst="rect">
             <a:avLst/>
@@ -6434,6 +6574,7 @@
           </a:bodyPr>
           <a:lstStyle/>
           <a:p>
+            <a:pPr algn="ctr"/>
             <a:r>
               <a:rPr lang="en-US" sz="1400" dirty="0" smtClean="0">
                 <a:solidFill>
@@ -6456,14 +6597,14 @@
       </p:sp>
       <p:sp>
         <p:nvSpPr>
-          <p:cNvPr id="132" name="TextBox 131"/>
+          <p:cNvPr id="121" name="TextBox 120"/>
           <p:cNvSpPr txBox="1"/>
           <p:nvPr/>
         </p:nvSpPr>
         <p:spPr>
           <a:xfrm flipH="1">
-            <a:off x="7810151" y="4909836"/>
-            <a:ext cx="846605" cy="307777"/>
+            <a:off x="10175189" y="4591214"/>
+            <a:ext cx="779047" cy="307777"/>
           </a:xfrm>
           <a:prstGeom prst="rect">
             <a:avLst/>
@@ -6476,21 +6617,49 @@
           </a:bodyPr>
           <a:lstStyle/>
           <a:p>
+            <a:pPr algn="ctr"/>
+            <a:r>
+              <a:rPr lang="en-US" sz="1400" dirty="0" smtClean="0"/>
+              <a:t>Ground</a:t>
+            </a:r>
+            <a:endParaRPr lang="en-US" sz="1400" dirty="0"/>
+          </a:p>
+        </p:txBody>
+      </p:sp>
+      <p:sp>
+        <p:nvSpPr>
+          <p:cNvPr id="123" name="TextBox 122"/>
+          <p:cNvSpPr txBox="1"/>
+          <p:nvPr/>
+        </p:nvSpPr>
+        <p:spPr>
+          <a:xfrm flipH="1">
+            <a:off x="10325819" y="4269694"/>
+            <a:ext cx="477788" cy="317338"/>
+          </a:xfrm>
+          <a:prstGeom prst="rect">
+            <a:avLst/>
+          </a:prstGeom>
+          <a:noFill/>
+        </p:spPr>
+        <p:txBody>
+          <a:bodyPr wrap="square" rtlCol="0">
+            <a:spAutoFit/>
+          </a:bodyPr>
+          <a:lstStyle/>
+          <a:p>
+            <a:pPr algn="ctr"/>
             <a:r>
               <a:rPr lang="en-US" sz="1400" dirty="0" smtClean="0">
                 <a:solidFill>
-                  <a:schemeClr val="accent2">
-                    <a:lumMod val="75000"/>
-                  </a:schemeClr>
+                  <a:srgbClr val="FF0000"/>
                 </a:solidFill>
               </a:rPr>
-              <a:t>Serial</a:t>
+              <a:t>Vin</a:t>
             </a:r>
             <a:endParaRPr lang="en-US" sz="1400" dirty="0">
               <a:solidFill>
-                <a:schemeClr val="accent2">
-                  <a:lumMod val="75000"/>
-                </a:schemeClr>
+                <a:srgbClr val="FF0000"/>
               </a:solidFill>
             </a:endParaRPr>
           </a:p>
@@ -6764,7 +6933,7 @@
   <a:extraClrSchemeLst/>
   <a:extLst>
     <a:ext uri="{05A4C25C-085E-4340-85A3-A5531E510DB2}">
-      <thm15:themeFamily xmlns:thm15="http://schemas.microsoft.com/office/thememl/2012/main" xmlns="" name="Office Theme" id="{62F939B6-93AF-4DB8-9C6B-D6C7DFDC589F}" vid="{4A3C46E8-61CC-4603-A589-7422A47A8E4A}"/>
+      <thm15:themeFamily xmlns:thm15="http://schemas.microsoft.com/office/thememl/2012/main" name="Office Theme" id="{62F939B6-93AF-4DB8-9C6B-D6C7DFDC589F}" vid="{4A3C46E8-61CC-4603-A589-7422A47A8E4A}"/>
     </a:ext>
   </a:extLst>
 </a:theme>

</xml_diff>